<commit_message>
added a message arch figure
</commit_message>
<xml_diff>
--- a/service-architecture/diagrams/message-flow-diagrams.pptx
+++ b/service-architecture/diagrams/message-flow-diagrams.pptx
@@ -9,6 +9,7 @@
     <p:sldId id="257" r:id="rId3"/>
     <p:sldId id="258" r:id="rId4"/>
     <p:sldId id="259" r:id="rId5"/>
+    <p:sldId id="260" r:id="rId6"/>
   </p:sldIdLst>
   <p:sldSz cx="9144000" cy="6858000" type="screen4x3"/>
   <p:notesSz cx="6858000" cy="9144000"/>
@@ -292,7 +293,7 @@
             <a:fld id="{51A32DD6-18F2-0144-A5D4-11CF5A8BD230}" type="datetimeFigureOut">
               <a:rPr lang="en-US" smtClean="0"/>
               <a:pPr/>
-              <a:t>9/29/12</a:t>
+              <a:t>10/2/12</a:t>
             </a:fld>
             <a:endParaRPr lang="en-US"/>
           </a:p>
@@ -459,7 +460,7 @@
             <a:fld id="{51A32DD6-18F2-0144-A5D4-11CF5A8BD230}" type="datetimeFigureOut">
               <a:rPr lang="en-US" smtClean="0"/>
               <a:pPr/>
-              <a:t>9/29/12</a:t>
+              <a:t>10/2/12</a:t>
             </a:fld>
             <a:endParaRPr lang="en-US"/>
           </a:p>
@@ -636,7 +637,7 @@
             <a:fld id="{51A32DD6-18F2-0144-A5D4-11CF5A8BD230}" type="datetimeFigureOut">
               <a:rPr lang="en-US" smtClean="0"/>
               <a:pPr/>
-              <a:t>9/29/12</a:t>
+              <a:t>10/2/12</a:t>
             </a:fld>
             <a:endParaRPr lang="en-US"/>
           </a:p>
@@ -803,7 +804,7 @@
             <a:fld id="{51A32DD6-18F2-0144-A5D4-11CF5A8BD230}" type="datetimeFigureOut">
               <a:rPr lang="en-US" smtClean="0"/>
               <a:pPr/>
-              <a:t>9/29/12</a:t>
+              <a:t>10/2/12</a:t>
             </a:fld>
             <a:endParaRPr lang="en-US"/>
           </a:p>
@@ -1046,7 +1047,7 @@
             <a:fld id="{51A32DD6-18F2-0144-A5D4-11CF5A8BD230}" type="datetimeFigureOut">
               <a:rPr lang="en-US" smtClean="0"/>
               <a:pPr/>
-              <a:t>9/29/12</a:t>
+              <a:t>10/2/12</a:t>
             </a:fld>
             <a:endParaRPr lang="en-US"/>
           </a:p>
@@ -1331,7 +1332,7 @@
             <a:fld id="{51A32DD6-18F2-0144-A5D4-11CF5A8BD230}" type="datetimeFigureOut">
               <a:rPr lang="en-US" smtClean="0"/>
               <a:pPr/>
-              <a:t>9/29/12</a:t>
+              <a:t>10/2/12</a:t>
             </a:fld>
             <a:endParaRPr lang="en-US"/>
           </a:p>
@@ -1750,7 +1751,7 @@
             <a:fld id="{51A32DD6-18F2-0144-A5D4-11CF5A8BD230}" type="datetimeFigureOut">
               <a:rPr lang="en-US" smtClean="0"/>
               <a:pPr/>
-              <a:t>9/29/12</a:t>
+              <a:t>10/2/12</a:t>
             </a:fld>
             <a:endParaRPr lang="en-US"/>
           </a:p>
@@ -1865,7 +1866,7 @@
             <a:fld id="{51A32DD6-18F2-0144-A5D4-11CF5A8BD230}" type="datetimeFigureOut">
               <a:rPr lang="en-US" smtClean="0"/>
               <a:pPr/>
-              <a:t>9/29/12</a:t>
+              <a:t>10/2/12</a:t>
             </a:fld>
             <a:endParaRPr lang="en-US"/>
           </a:p>
@@ -1957,7 +1958,7 @@
             <a:fld id="{51A32DD6-18F2-0144-A5D4-11CF5A8BD230}" type="datetimeFigureOut">
               <a:rPr lang="en-US" smtClean="0"/>
               <a:pPr/>
-              <a:t>9/29/12</a:t>
+              <a:t>10/2/12</a:t>
             </a:fld>
             <a:endParaRPr lang="en-US"/>
           </a:p>
@@ -2231,7 +2232,7 @@
             <a:fld id="{51A32DD6-18F2-0144-A5D4-11CF5A8BD230}" type="datetimeFigureOut">
               <a:rPr lang="en-US" smtClean="0"/>
               <a:pPr/>
-              <a:t>9/29/12</a:t>
+              <a:t>10/2/12</a:t>
             </a:fld>
             <a:endParaRPr lang="en-US"/>
           </a:p>
@@ -2481,7 +2482,7 @@
             <a:fld id="{51A32DD6-18F2-0144-A5D4-11CF5A8BD230}" type="datetimeFigureOut">
               <a:rPr lang="en-US" smtClean="0"/>
               <a:pPr/>
-              <a:t>9/29/12</a:t>
+              <a:t>10/2/12</a:t>
             </a:fld>
             <a:endParaRPr lang="en-US"/>
           </a:p>
@@ -2691,7 +2692,7 @@
             <a:fld id="{51A32DD6-18F2-0144-A5D4-11CF5A8BD230}" type="datetimeFigureOut">
               <a:rPr lang="en-US" smtClean="0"/>
               <a:pPr/>
-              <a:t>9/29/12</a:t>
+              <a:t>10/2/12</a:t>
             </a:fld>
             <a:endParaRPr lang="en-US"/>
           </a:p>
@@ -5358,15 +5359,7 @@
                   <a:srgbClr val="000000"/>
                 </a:solidFill>
               </a:rPr>
-              <a:t>Message and Thread Management (</a:t>
-            </a:r>
-            <a:r>
-              <a:rPr lang="en-US" sz="1500" dirty="0" smtClean="0">
-                <a:solidFill>
-                  <a:srgbClr val="000000"/>
-                </a:solidFill>
-              </a:rPr>
-              <a:t>Mule)</a:t>
+              <a:t>Message and Thread Management (Mule)</a:t>
             </a:r>
             <a:endParaRPr dirty="0">
               <a:solidFill>
@@ -5558,11 +5551,7 @@
             </a:r>
             <a:r>
               <a:rPr lang="en-US" sz="1500" dirty="0" smtClean="0"/>
-              <a:t> Component Membership  </a:t>
-            </a:r>
-            <a:r>
-              <a:rPr lang="en-US" sz="1500" dirty="0" smtClean="0"/>
-              <a:t>(</a:t>
+              <a:t> Component Membership  (</a:t>
             </a:r>
             <a:r>
               <a:rPr lang="en-US" sz="1500" dirty="0" err="1" smtClean="0"/>
@@ -5945,6 +5934,1296 @@
   <p:clrMapOvr>
     <a:masterClrMapping/>
   </p:clrMapOvr>
+</p:sld>
+</file>
+
+<file path=ppt/slides/slide5.xml><?xml version="1.0" encoding="utf-8"?>
+<p:sld xmlns:a="http://schemas.openxmlformats.org/drawingml/2006/main" xmlns:r="http://schemas.openxmlformats.org/officeDocument/2006/relationships" xmlns:mc="http://schemas.openxmlformats.org/markup-compatibility/2006" xmlns:mv="urn:schemas-microsoft-com:mac:vml" xmlns:p="http://schemas.openxmlformats.org/presentationml/2006/main" mc:Ignorable="mv" mc:PreserveAttributes="mv:*">
+  <p:cSld>
+    <p:spTree>
+      <p:nvGrpSpPr>
+        <p:cNvPr id="1" name=""/>
+        <p:cNvGrpSpPr/>
+        <p:nvPr/>
+      </p:nvGrpSpPr>
+      <p:grpSpPr>
+        <a:xfrm>
+          <a:off x="0" y="0"/>
+          <a:ext cx="0" cy="0"/>
+          <a:chOff x="0" y="0"/>
+          <a:chExt cx="0" cy="0"/>
+        </a:xfrm>
+      </p:grpSpPr>
+      <p:sp>
+        <p:nvSpPr>
+          <p:cNvPr id="50" name="Arc 49"/>
+          <p:cNvSpPr/>
+          <p:nvPr/>
+        </p:nvSpPr>
+        <p:spPr bwMode="auto">
+          <a:xfrm rot="2220000" flipH="1">
+            <a:off x="7520049" y="1288086"/>
+            <a:ext cx="1465179" cy="1424252"/>
+          </a:xfrm>
+          <a:prstGeom prst="arc">
+            <a:avLst>
+              <a:gd name="adj1" fmla="val 4392974"/>
+              <a:gd name="adj2" fmla="val 0"/>
+            </a:avLst>
+          </a:prstGeom>
+          <a:ln w="57150" cap="flat" cmpd="sng" algn="ctr">
+            <a:solidFill>
+              <a:schemeClr val="tx1"/>
+            </a:solidFill>
+            <a:prstDash val="solid"/>
+            <a:round/>
+            <a:headEnd type="none" w="med" len="med"/>
+            <a:tailEnd type="triangle" w="med" len="med"/>
+          </a:ln>
+        </p:spPr>
+        <p:style>
+          <a:lnRef idx="2">
+            <a:schemeClr val="accent1"/>
+          </a:lnRef>
+          <a:fillRef idx="0">
+            <a:schemeClr val="accent1"/>
+          </a:fillRef>
+          <a:effectRef idx="1">
+            <a:schemeClr val="accent1"/>
+          </a:effectRef>
+          <a:fontRef idx="minor">
+            <a:schemeClr val="tx1"/>
+          </a:fontRef>
+        </p:style>
+        <p:txBody>
+          <a:bodyPr anchor="ctr"/>
+          <a:lstStyle/>
+          <a:p>
+            <a:pPr algn="ctr">
+              <a:defRPr/>
+            </a:pPr>
+            <a:endParaRPr lang="en-US">
+              <a:ea typeface="ＭＳ Ｐゴシック" charset="0"/>
+              <a:cs typeface="ＭＳ Ｐゴシック" charset="0"/>
+            </a:endParaRPr>
+          </a:p>
+        </p:txBody>
+      </p:sp>
+      <p:sp>
+        <p:nvSpPr>
+          <p:cNvPr id="12" name="Snip Single Corner Rectangle 11"/>
+          <p:cNvSpPr/>
+          <p:nvPr/>
+        </p:nvSpPr>
+        <p:spPr>
+          <a:xfrm>
+            <a:off x="76200" y="3129348"/>
+            <a:ext cx="1066800" cy="833052"/>
+          </a:xfrm>
+          <a:prstGeom prst="snip1Rect">
+            <a:avLst/>
+          </a:prstGeom>
+        </p:spPr>
+        <p:style>
+          <a:lnRef idx="1">
+            <a:schemeClr val="accent1"/>
+          </a:lnRef>
+          <a:fillRef idx="3">
+            <a:schemeClr val="accent1"/>
+          </a:fillRef>
+          <a:effectRef idx="2">
+            <a:schemeClr val="accent1"/>
+          </a:effectRef>
+          <a:fontRef idx="minor">
+            <a:schemeClr val="lt1"/>
+          </a:fontRef>
+        </p:style>
+        <p:txBody>
+          <a:bodyPr rtlCol="0" anchor="ctr"/>
+          <a:lstStyle/>
+          <a:p>
+            <a:pPr algn="ctr"/>
+            <a:r>
+              <a:rPr lang="en-US" sz="1600" dirty="0" smtClean="0">
+                <a:solidFill>
+                  <a:schemeClr val="tx1"/>
+                </a:solidFill>
+              </a:rPr>
+              <a:t>User</a:t>
+            </a:r>
+          </a:p>
+          <a:p>
+            <a:pPr algn="ctr"/>
+            <a:r>
+              <a:rPr lang="en-US" sz="1600" dirty="0" smtClean="0">
+                <a:solidFill>
+                  <a:schemeClr val="tx1"/>
+                </a:solidFill>
+              </a:rPr>
+              <a:t>Request</a:t>
+            </a:r>
+            <a:endParaRPr lang="en-US" sz="1600" dirty="0">
+              <a:solidFill>
+                <a:schemeClr val="tx1"/>
+              </a:solidFill>
+            </a:endParaRPr>
+          </a:p>
+        </p:txBody>
+      </p:sp>
+      <p:sp>
+        <p:nvSpPr>
+          <p:cNvPr id="13" name="Rounded Rectangle 12"/>
+          <p:cNvSpPr/>
+          <p:nvPr/>
+        </p:nvSpPr>
+        <p:spPr>
+          <a:xfrm>
+            <a:off x="1219200" y="533400"/>
+            <a:ext cx="1858026" cy="5753099"/>
+          </a:xfrm>
+          <a:prstGeom prst="roundRect">
+            <a:avLst/>
+          </a:prstGeom>
+          <a:solidFill>
+            <a:schemeClr val="tx2">
+              <a:lumMod val="60000"/>
+              <a:lumOff val="40000"/>
+              <a:alpha val="30000"/>
+            </a:schemeClr>
+          </a:solidFill>
+          <a:ln>
+            <a:solidFill>
+              <a:schemeClr val="accent1">
+                <a:shade val="95000"/>
+                <a:satMod val="105000"/>
+              </a:schemeClr>
+            </a:solidFill>
+          </a:ln>
+        </p:spPr>
+        <p:style>
+          <a:lnRef idx="1">
+            <a:schemeClr val="accent1"/>
+          </a:lnRef>
+          <a:fillRef idx="3">
+            <a:schemeClr val="accent1"/>
+          </a:fillRef>
+          <a:effectRef idx="2">
+            <a:schemeClr val="accent1"/>
+          </a:effectRef>
+          <a:fontRef idx="minor">
+            <a:schemeClr val="lt1"/>
+          </a:fontRef>
+        </p:style>
+        <p:txBody>
+          <a:bodyPr rtlCol="0" anchor="ctr"/>
+          <a:lstStyle/>
+          <a:p>
+            <a:pPr algn="ctr"/>
+            <a:endParaRPr lang="en-US" dirty="0" smtClean="0"/>
+          </a:p>
+          <a:p>
+            <a:pPr algn="ctr"/>
+            <a:r>
+              <a:rPr lang="en-US" dirty="0" smtClean="0"/>
+              <a:t/>
+            </a:r>
+          </a:p>
+          <a:p>
+            <a:pPr algn="ctr"/>
+            <a:r>
+              <a:rPr lang="en-US" dirty="0" smtClean="0"/>
+              <a:t/>
+            </a:r>
+          </a:p>
+          <a:p>
+            <a:pPr algn="ctr"/>
+            <a:r>
+              <a:rPr lang="en-US" dirty="0" smtClean="0"/>
+              <a:t/>
+            </a:r>
+            <a:endParaRPr lang="en-US" dirty="0"/>
+          </a:p>
+        </p:txBody>
+      </p:sp>
+      <p:sp>
+        <p:nvSpPr>
+          <p:cNvPr id="16" name="Rounded Rectangle 15"/>
+          <p:cNvSpPr/>
+          <p:nvPr/>
+        </p:nvSpPr>
+        <p:spPr>
+          <a:xfrm>
+            <a:off x="1295400" y="1143000"/>
+            <a:ext cx="1705626" cy="891400"/>
+          </a:xfrm>
+          <a:prstGeom prst="roundRect">
+            <a:avLst/>
+          </a:prstGeom>
+          <a:solidFill>
+            <a:srgbClr val="558ED5"/>
+          </a:solidFill>
+        </p:spPr>
+        <p:style>
+          <a:lnRef idx="1">
+            <a:schemeClr val="accent1"/>
+          </a:lnRef>
+          <a:fillRef idx="3">
+            <a:schemeClr val="accent1"/>
+          </a:fillRef>
+          <a:effectRef idx="2">
+            <a:schemeClr val="accent1"/>
+          </a:effectRef>
+          <a:fontRef idx="minor">
+            <a:schemeClr val="lt1"/>
+          </a:fontRef>
+        </p:style>
+        <p:txBody>
+          <a:bodyPr rtlCol="0" anchor="ctr"/>
+          <a:lstStyle/>
+          <a:p>
+            <a:pPr algn="ctr"/>
+            <a:r>
+              <a:rPr lang="en-US" sz="1600" dirty="0" smtClean="0"/>
+              <a:t>Authorization</a:t>
+            </a:r>
+            <a:endParaRPr lang="en-US" sz="1600" dirty="0"/>
+          </a:p>
+        </p:txBody>
+      </p:sp>
+      <p:sp>
+        <p:nvSpPr>
+          <p:cNvPr id="17" name="Rounded Rectangle 16"/>
+          <p:cNvSpPr/>
+          <p:nvPr/>
+        </p:nvSpPr>
+        <p:spPr>
+          <a:xfrm>
+            <a:off x="3581400" y="533400"/>
+            <a:ext cx="1858026" cy="5753099"/>
+          </a:xfrm>
+          <a:prstGeom prst="roundRect">
+            <a:avLst/>
+          </a:prstGeom>
+          <a:solidFill>
+            <a:schemeClr val="tx2">
+              <a:lumMod val="60000"/>
+              <a:lumOff val="40000"/>
+              <a:alpha val="30000"/>
+            </a:schemeClr>
+          </a:solidFill>
+          <a:ln>
+            <a:solidFill>
+              <a:schemeClr val="accent1">
+                <a:shade val="95000"/>
+                <a:satMod val="105000"/>
+              </a:schemeClr>
+            </a:solidFill>
+          </a:ln>
+        </p:spPr>
+        <p:style>
+          <a:lnRef idx="1">
+            <a:schemeClr val="accent1"/>
+          </a:lnRef>
+          <a:fillRef idx="3">
+            <a:schemeClr val="accent1"/>
+          </a:fillRef>
+          <a:effectRef idx="2">
+            <a:schemeClr val="accent1"/>
+          </a:effectRef>
+          <a:fontRef idx="minor">
+            <a:schemeClr val="lt1"/>
+          </a:fontRef>
+        </p:style>
+        <p:txBody>
+          <a:bodyPr rtlCol="0" anchor="ctr"/>
+          <a:lstStyle/>
+          <a:p>
+            <a:pPr algn="ctr"/>
+            <a:endParaRPr lang="en-US" dirty="0" smtClean="0"/>
+          </a:p>
+          <a:p>
+            <a:pPr algn="ctr"/>
+            <a:r>
+              <a:rPr lang="en-US" dirty="0" smtClean="0"/>
+              <a:t/>
+            </a:r>
+          </a:p>
+          <a:p>
+            <a:pPr algn="ctr"/>
+            <a:r>
+              <a:rPr lang="en-US" dirty="0" smtClean="0"/>
+              <a:t/>
+            </a:r>
+          </a:p>
+          <a:p>
+            <a:pPr algn="ctr"/>
+            <a:r>
+              <a:rPr lang="en-US" dirty="0" smtClean="0"/>
+              <a:t/>
+            </a:r>
+            <a:endParaRPr lang="en-US" dirty="0"/>
+          </a:p>
+        </p:txBody>
+      </p:sp>
+      <p:sp>
+        <p:nvSpPr>
+          <p:cNvPr id="18" name="Rounded Rectangle 17"/>
+          <p:cNvSpPr/>
+          <p:nvPr/>
+        </p:nvSpPr>
+        <p:spPr>
+          <a:xfrm>
+            <a:off x="5943600" y="533400"/>
+            <a:ext cx="1858026" cy="5753099"/>
+          </a:xfrm>
+          <a:prstGeom prst="roundRect">
+            <a:avLst/>
+          </a:prstGeom>
+          <a:solidFill>
+            <a:schemeClr val="tx2">
+              <a:lumMod val="60000"/>
+              <a:lumOff val="40000"/>
+              <a:alpha val="30000"/>
+            </a:schemeClr>
+          </a:solidFill>
+          <a:ln>
+            <a:solidFill>
+              <a:schemeClr val="accent1">
+                <a:shade val="95000"/>
+                <a:satMod val="105000"/>
+              </a:schemeClr>
+            </a:solidFill>
+          </a:ln>
+        </p:spPr>
+        <p:style>
+          <a:lnRef idx="1">
+            <a:schemeClr val="accent1"/>
+          </a:lnRef>
+          <a:fillRef idx="3">
+            <a:schemeClr val="accent1"/>
+          </a:fillRef>
+          <a:effectRef idx="2">
+            <a:schemeClr val="accent1"/>
+          </a:effectRef>
+          <a:fontRef idx="minor">
+            <a:schemeClr val="lt1"/>
+          </a:fontRef>
+        </p:style>
+        <p:txBody>
+          <a:bodyPr rtlCol="0" anchor="ctr"/>
+          <a:lstStyle/>
+          <a:p>
+            <a:pPr algn="ctr"/>
+            <a:endParaRPr lang="en-US" dirty="0" smtClean="0"/>
+          </a:p>
+          <a:p>
+            <a:pPr algn="ctr"/>
+            <a:r>
+              <a:rPr lang="en-US" dirty="0" smtClean="0"/>
+              <a:t/>
+            </a:r>
+          </a:p>
+          <a:p>
+            <a:pPr algn="ctr"/>
+            <a:r>
+              <a:rPr lang="en-US" dirty="0" smtClean="0"/>
+              <a:t/>
+            </a:r>
+          </a:p>
+          <a:p>
+            <a:pPr algn="ctr"/>
+            <a:r>
+              <a:rPr lang="en-US" dirty="0" smtClean="0"/>
+              <a:t/>
+            </a:r>
+            <a:endParaRPr lang="en-US" dirty="0"/>
+          </a:p>
+        </p:txBody>
+      </p:sp>
+      <p:sp>
+        <p:nvSpPr>
+          <p:cNvPr id="19" name="Rounded Rectangle 18"/>
+          <p:cNvSpPr/>
+          <p:nvPr/>
+        </p:nvSpPr>
+        <p:spPr>
+          <a:xfrm>
+            <a:off x="1295400" y="2766200"/>
+            <a:ext cx="1705626" cy="891400"/>
+          </a:xfrm>
+          <a:prstGeom prst="roundRect">
+            <a:avLst/>
+          </a:prstGeom>
+          <a:solidFill>
+            <a:srgbClr val="558ED5"/>
+          </a:solidFill>
+        </p:spPr>
+        <p:style>
+          <a:lnRef idx="1">
+            <a:schemeClr val="accent1"/>
+          </a:lnRef>
+          <a:fillRef idx="3">
+            <a:schemeClr val="accent1"/>
+          </a:fillRef>
+          <a:effectRef idx="2">
+            <a:schemeClr val="accent1"/>
+          </a:effectRef>
+          <a:fontRef idx="minor">
+            <a:schemeClr val="lt1"/>
+          </a:fontRef>
+        </p:style>
+        <p:txBody>
+          <a:bodyPr rtlCol="0" anchor="ctr"/>
+          <a:lstStyle/>
+          <a:p>
+            <a:pPr algn="ctr"/>
+            <a:r>
+              <a:rPr lang="en-US" sz="1600" dirty="0" smtClean="0"/>
+              <a:t>Validation</a:t>
+            </a:r>
+            <a:endParaRPr lang="en-US" sz="1600" dirty="0"/>
+          </a:p>
+        </p:txBody>
+      </p:sp>
+      <p:sp>
+        <p:nvSpPr>
+          <p:cNvPr id="20" name="Rounded Rectangle 19"/>
+          <p:cNvSpPr/>
+          <p:nvPr/>
+        </p:nvSpPr>
+        <p:spPr>
+          <a:xfrm>
+            <a:off x="1295400" y="4366400"/>
+            <a:ext cx="1705626" cy="891400"/>
+          </a:xfrm>
+          <a:prstGeom prst="roundRect">
+            <a:avLst/>
+          </a:prstGeom>
+          <a:solidFill>
+            <a:srgbClr val="558ED5"/>
+          </a:solidFill>
+        </p:spPr>
+        <p:style>
+          <a:lnRef idx="1">
+            <a:schemeClr val="accent1"/>
+          </a:lnRef>
+          <a:fillRef idx="3">
+            <a:schemeClr val="accent1"/>
+          </a:fillRef>
+          <a:effectRef idx="2">
+            <a:schemeClr val="accent1"/>
+          </a:effectRef>
+          <a:fontRef idx="minor">
+            <a:schemeClr val="lt1"/>
+          </a:fontRef>
+        </p:style>
+        <p:txBody>
+          <a:bodyPr rtlCol="0" anchor="ctr"/>
+          <a:lstStyle/>
+          <a:p>
+            <a:pPr algn="ctr"/>
+            <a:r>
+              <a:rPr lang="en-US" sz="1600" dirty="0" smtClean="0"/>
+              <a:t>Reservation</a:t>
+            </a:r>
+            <a:endParaRPr lang="en-US" sz="1600" dirty="0"/>
+          </a:p>
+        </p:txBody>
+      </p:sp>
+      <p:sp>
+        <p:nvSpPr>
+          <p:cNvPr id="21" name="Rounded Rectangle 20"/>
+          <p:cNvSpPr/>
+          <p:nvPr/>
+        </p:nvSpPr>
+        <p:spPr>
+          <a:xfrm>
+            <a:off x="3657600" y="1524000"/>
+            <a:ext cx="1705626" cy="891400"/>
+          </a:xfrm>
+          <a:prstGeom prst="roundRect">
+            <a:avLst/>
+          </a:prstGeom>
+          <a:solidFill>
+            <a:srgbClr val="558ED5"/>
+          </a:solidFill>
+        </p:spPr>
+        <p:style>
+          <a:lnRef idx="1">
+            <a:schemeClr val="accent1"/>
+          </a:lnRef>
+          <a:fillRef idx="3">
+            <a:schemeClr val="accent1"/>
+          </a:fillRef>
+          <a:effectRef idx="2">
+            <a:schemeClr val="accent1"/>
+          </a:effectRef>
+          <a:fontRef idx="minor">
+            <a:schemeClr val="lt1"/>
+          </a:fontRef>
+        </p:style>
+        <p:txBody>
+          <a:bodyPr rtlCol="0" anchor="ctr"/>
+          <a:lstStyle/>
+          <a:p>
+            <a:pPr algn="ctr"/>
+            <a:r>
+              <a:rPr lang="en-US" sz="1600" dirty="0" smtClean="0"/>
+              <a:t>Fulfilled</a:t>
+            </a:r>
+            <a:endParaRPr lang="en-US" sz="1600" dirty="0"/>
+          </a:p>
+        </p:txBody>
+      </p:sp>
+      <p:sp>
+        <p:nvSpPr>
+          <p:cNvPr id="22" name="Rounded Rectangle 21"/>
+          <p:cNvSpPr/>
+          <p:nvPr/>
+        </p:nvSpPr>
+        <p:spPr>
+          <a:xfrm>
+            <a:off x="3657600" y="4114800"/>
+            <a:ext cx="1705626" cy="891400"/>
+          </a:xfrm>
+          <a:prstGeom prst="roundRect">
+            <a:avLst/>
+          </a:prstGeom>
+          <a:solidFill>
+            <a:srgbClr val="558ED5"/>
+          </a:solidFill>
+        </p:spPr>
+        <p:style>
+          <a:lnRef idx="1">
+            <a:schemeClr val="accent1"/>
+          </a:lnRef>
+          <a:fillRef idx="3">
+            <a:schemeClr val="accent1"/>
+          </a:fillRef>
+          <a:effectRef idx="2">
+            <a:schemeClr val="accent1"/>
+          </a:effectRef>
+          <a:fontRef idx="minor">
+            <a:schemeClr val="lt1"/>
+          </a:fontRef>
+        </p:style>
+        <p:txBody>
+          <a:bodyPr rtlCol="0" anchor="ctr"/>
+          <a:lstStyle/>
+          <a:p>
+            <a:pPr algn="ctr"/>
+            <a:r>
+              <a:rPr lang="en-US" sz="1600" dirty="0" smtClean="0"/>
+              <a:t>in Progress</a:t>
+            </a:r>
+            <a:endParaRPr lang="en-US" sz="1600" dirty="0"/>
+          </a:p>
+        </p:txBody>
+      </p:sp>
+      <p:sp>
+        <p:nvSpPr>
+          <p:cNvPr id="23" name="Rounded Rectangle 22"/>
+          <p:cNvSpPr/>
+          <p:nvPr/>
+        </p:nvSpPr>
+        <p:spPr>
+          <a:xfrm>
+            <a:off x="6019800" y="4114800"/>
+            <a:ext cx="1705626" cy="891400"/>
+          </a:xfrm>
+          <a:prstGeom prst="roundRect">
+            <a:avLst/>
+          </a:prstGeom>
+          <a:solidFill>
+            <a:srgbClr val="558ED5"/>
+          </a:solidFill>
+        </p:spPr>
+        <p:style>
+          <a:lnRef idx="1">
+            <a:schemeClr val="accent1"/>
+          </a:lnRef>
+          <a:fillRef idx="3">
+            <a:schemeClr val="accent1"/>
+          </a:fillRef>
+          <a:effectRef idx="2">
+            <a:schemeClr val="accent1"/>
+          </a:effectRef>
+          <a:fontRef idx="minor">
+            <a:schemeClr val="lt1"/>
+          </a:fontRef>
+        </p:style>
+        <p:txBody>
+          <a:bodyPr rtlCol="0" anchor="ctr"/>
+          <a:lstStyle/>
+          <a:p>
+            <a:pPr algn="ctr"/>
+            <a:r>
+              <a:rPr lang="en-US" sz="1600" dirty="0" smtClean="0"/>
+              <a:t>Resource Allocation</a:t>
+            </a:r>
+            <a:endParaRPr lang="en-US" sz="1600" dirty="0"/>
+          </a:p>
+        </p:txBody>
+      </p:sp>
+      <p:sp>
+        <p:nvSpPr>
+          <p:cNvPr id="24" name="Rounded Rectangle 23"/>
+          <p:cNvSpPr/>
+          <p:nvPr/>
+        </p:nvSpPr>
+        <p:spPr>
+          <a:xfrm>
+            <a:off x="6019800" y="1524000"/>
+            <a:ext cx="1705626" cy="891400"/>
+          </a:xfrm>
+          <a:prstGeom prst="roundRect">
+            <a:avLst/>
+          </a:prstGeom>
+          <a:solidFill>
+            <a:srgbClr val="558ED5"/>
+          </a:solidFill>
+        </p:spPr>
+        <p:style>
+          <a:lnRef idx="1">
+            <a:schemeClr val="accent1"/>
+          </a:lnRef>
+          <a:fillRef idx="3">
+            <a:schemeClr val="accent1"/>
+          </a:fillRef>
+          <a:effectRef idx="2">
+            <a:schemeClr val="accent1"/>
+          </a:effectRef>
+          <a:fontRef idx="minor">
+            <a:schemeClr val="lt1"/>
+          </a:fontRef>
+        </p:style>
+        <p:txBody>
+          <a:bodyPr rtlCol="0" anchor="ctr"/>
+          <a:lstStyle/>
+          <a:p>
+            <a:pPr algn="ctr"/>
+            <a:r>
+              <a:rPr lang="en-US" sz="1600" dirty="0" smtClean="0"/>
+              <a:t>Resource State Update</a:t>
+            </a:r>
+            <a:endParaRPr lang="en-US" sz="1600" dirty="0"/>
+          </a:p>
+        </p:txBody>
+      </p:sp>
+      <p:sp>
+        <p:nvSpPr>
+          <p:cNvPr id="25" name="Down Arrow 24"/>
+          <p:cNvSpPr/>
+          <p:nvPr/>
+        </p:nvSpPr>
+        <p:spPr>
+          <a:xfrm>
+            <a:off x="1981200" y="2133600"/>
+            <a:ext cx="351799" cy="535332"/>
+          </a:xfrm>
+          <a:prstGeom prst="downArrow">
+            <a:avLst/>
+          </a:prstGeom>
+        </p:spPr>
+        <p:style>
+          <a:lnRef idx="1">
+            <a:schemeClr val="accent1"/>
+          </a:lnRef>
+          <a:fillRef idx="3">
+            <a:schemeClr val="accent1"/>
+          </a:fillRef>
+          <a:effectRef idx="2">
+            <a:schemeClr val="accent1"/>
+          </a:effectRef>
+          <a:fontRef idx="minor">
+            <a:schemeClr val="lt1"/>
+          </a:fontRef>
+        </p:style>
+        <p:txBody>
+          <a:bodyPr rtlCol="0" anchor="ctr"/>
+          <a:lstStyle/>
+          <a:p>
+            <a:pPr algn="ctr"/>
+            <a:endParaRPr lang="en-US"/>
+          </a:p>
+        </p:txBody>
+      </p:sp>
+      <p:sp>
+        <p:nvSpPr>
+          <p:cNvPr id="26" name="Down Arrow 25"/>
+          <p:cNvSpPr/>
+          <p:nvPr/>
+        </p:nvSpPr>
+        <p:spPr>
+          <a:xfrm>
+            <a:off x="1981200" y="3731868"/>
+            <a:ext cx="351799" cy="535332"/>
+          </a:xfrm>
+          <a:prstGeom prst="downArrow">
+            <a:avLst/>
+          </a:prstGeom>
+        </p:spPr>
+        <p:style>
+          <a:lnRef idx="1">
+            <a:schemeClr val="accent1"/>
+          </a:lnRef>
+          <a:fillRef idx="3">
+            <a:schemeClr val="accent1"/>
+          </a:fillRef>
+          <a:effectRef idx="2">
+            <a:schemeClr val="accent1"/>
+          </a:effectRef>
+          <a:fontRef idx="minor">
+            <a:schemeClr val="lt1"/>
+          </a:fontRef>
+        </p:style>
+        <p:txBody>
+          <a:bodyPr rtlCol="0" anchor="ctr"/>
+          <a:lstStyle/>
+          <a:p>
+            <a:pPr algn="ctr"/>
+            <a:endParaRPr lang="en-US"/>
+          </a:p>
+        </p:txBody>
+      </p:sp>
+      <p:cxnSp>
+        <p:nvCxnSpPr>
+          <p:cNvPr id="28" name="Straight Arrow Connector 27"/>
+          <p:cNvCxnSpPr>
+            <a:stCxn id="20" idx="3"/>
+            <a:endCxn id="22" idx="1"/>
+          </p:cNvCxnSpPr>
+          <p:nvPr/>
+        </p:nvCxnSpPr>
+        <p:spPr>
+          <a:xfrm flipV="1">
+            <a:off x="3001026" y="4560500"/>
+            <a:ext cx="656574" cy="251600"/>
+          </a:xfrm>
+          <a:prstGeom prst="straightConnector1">
+            <a:avLst/>
+          </a:prstGeom>
+          <a:ln>
+            <a:solidFill>
+              <a:srgbClr val="000000"/>
+            </a:solidFill>
+            <a:tailEnd type="arrow"/>
+          </a:ln>
+        </p:spPr>
+        <p:style>
+          <a:lnRef idx="2">
+            <a:schemeClr val="accent1"/>
+          </a:lnRef>
+          <a:fillRef idx="0">
+            <a:schemeClr val="accent1"/>
+          </a:fillRef>
+          <a:effectRef idx="1">
+            <a:schemeClr val="accent1"/>
+          </a:effectRef>
+          <a:fontRef idx="minor">
+            <a:schemeClr val="tx1"/>
+          </a:fontRef>
+        </p:style>
+      </p:cxnSp>
+      <p:cxnSp>
+        <p:nvCxnSpPr>
+          <p:cNvPr id="30" name="Straight Arrow Connector 29"/>
+          <p:cNvCxnSpPr/>
+          <p:nvPr/>
+        </p:nvCxnSpPr>
+        <p:spPr>
+          <a:xfrm>
+            <a:off x="5363226" y="4789100"/>
+            <a:ext cx="656574" cy="11500"/>
+          </a:xfrm>
+          <a:prstGeom prst="straightConnector1">
+            <a:avLst/>
+          </a:prstGeom>
+          <a:ln>
+            <a:solidFill>
+              <a:srgbClr val="000000"/>
+            </a:solidFill>
+            <a:tailEnd type="arrow"/>
+          </a:ln>
+        </p:spPr>
+        <p:style>
+          <a:lnRef idx="2">
+            <a:schemeClr val="accent1"/>
+          </a:lnRef>
+          <a:fillRef idx="0">
+            <a:schemeClr val="accent1"/>
+          </a:fillRef>
+          <a:effectRef idx="1">
+            <a:schemeClr val="accent1"/>
+          </a:effectRef>
+          <a:fontRef idx="minor">
+            <a:schemeClr val="tx1"/>
+          </a:fontRef>
+        </p:style>
+      </p:cxnSp>
+      <p:sp>
+        <p:nvSpPr>
+          <p:cNvPr id="33" name="Oval 32"/>
+          <p:cNvSpPr/>
+          <p:nvPr/>
+        </p:nvSpPr>
+        <p:spPr>
+          <a:xfrm>
+            <a:off x="8077200" y="2209800"/>
+            <a:ext cx="830451" cy="863166"/>
+          </a:xfrm>
+          <a:prstGeom prst="ellipse">
+            <a:avLst/>
+          </a:prstGeom>
+        </p:spPr>
+        <p:style>
+          <a:lnRef idx="1">
+            <a:schemeClr val="accent1"/>
+          </a:lnRef>
+          <a:fillRef idx="3">
+            <a:schemeClr val="accent1"/>
+          </a:fillRef>
+          <a:effectRef idx="2">
+            <a:schemeClr val="accent1"/>
+          </a:effectRef>
+          <a:fontRef idx="minor">
+            <a:schemeClr val="lt1"/>
+          </a:fontRef>
+        </p:style>
+        <p:txBody>
+          <a:bodyPr rtlCol="0" anchor="ctr"/>
+          <a:lstStyle/>
+          <a:p>
+            <a:pPr algn="ctr"/>
+            <a:endParaRPr lang="en-US" sz="1400" dirty="0"/>
+          </a:p>
+        </p:txBody>
+      </p:sp>
+      <p:cxnSp>
+        <p:nvCxnSpPr>
+          <p:cNvPr id="35" name="Straight Arrow Connector 34"/>
+          <p:cNvCxnSpPr>
+            <a:stCxn id="23" idx="3"/>
+            <a:endCxn id="33" idx="3"/>
+          </p:cNvCxnSpPr>
+          <p:nvPr/>
+        </p:nvCxnSpPr>
+        <p:spPr>
+          <a:xfrm flipV="1">
+            <a:off x="7725426" y="2946558"/>
+            <a:ext cx="473391" cy="1613942"/>
+          </a:xfrm>
+          <a:prstGeom prst="straightConnector1">
+            <a:avLst/>
+          </a:prstGeom>
+          <a:ln>
+            <a:solidFill>
+              <a:srgbClr val="000000"/>
+            </a:solidFill>
+            <a:tailEnd type="arrow"/>
+          </a:ln>
+        </p:spPr>
+        <p:style>
+          <a:lnRef idx="2">
+            <a:schemeClr val="accent1"/>
+          </a:lnRef>
+          <a:fillRef idx="0">
+            <a:schemeClr val="accent1"/>
+          </a:fillRef>
+          <a:effectRef idx="1">
+            <a:schemeClr val="accent1"/>
+          </a:effectRef>
+          <a:fontRef idx="minor">
+            <a:schemeClr val="tx1"/>
+          </a:fontRef>
+        </p:style>
+      </p:cxnSp>
+      <p:cxnSp>
+        <p:nvCxnSpPr>
+          <p:cNvPr id="44" name="Straight Arrow Connector 43"/>
+          <p:cNvCxnSpPr>
+            <a:stCxn id="24" idx="2"/>
+            <a:endCxn id="23" idx="0"/>
+          </p:cNvCxnSpPr>
+          <p:nvPr/>
+        </p:nvCxnSpPr>
+        <p:spPr>
+          <a:xfrm rot="5400000">
+            <a:off x="6022913" y="3265100"/>
+            <a:ext cx="1699400" cy="1588"/>
+          </a:xfrm>
+          <a:prstGeom prst="straightConnector1">
+            <a:avLst/>
+          </a:prstGeom>
+          <a:ln>
+            <a:solidFill>
+              <a:srgbClr val="000000"/>
+            </a:solidFill>
+            <a:tailEnd type="arrow"/>
+          </a:ln>
+        </p:spPr>
+        <p:style>
+          <a:lnRef idx="2">
+            <a:schemeClr val="accent1"/>
+          </a:lnRef>
+          <a:fillRef idx="0">
+            <a:schemeClr val="accent1"/>
+          </a:fillRef>
+          <a:effectRef idx="1">
+            <a:schemeClr val="accent1"/>
+          </a:effectRef>
+          <a:fontRef idx="minor">
+            <a:schemeClr val="tx1"/>
+          </a:fontRef>
+        </p:style>
+      </p:cxnSp>
+      <p:cxnSp>
+        <p:nvCxnSpPr>
+          <p:cNvPr id="46" name="Straight Arrow Connector 45"/>
+          <p:cNvCxnSpPr>
+            <a:stCxn id="19" idx="3"/>
+          </p:cNvCxnSpPr>
+          <p:nvPr/>
+        </p:nvCxnSpPr>
+        <p:spPr>
+          <a:xfrm flipV="1">
+            <a:off x="3001026" y="2362200"/>
+            <a:ext cx="656574" cy="849700"/>
+          </a:xfrm>
+          <a:prstGeom prst="straightConnector1">
+            <a:avLst/>
+          </a:prstGeom>
+          <a:ln>
+            <a:solidFill>
+              <a:srgbClr val="000000"/>
+            </a:solidFill>
+            <a:headEnd type="arrow"/>
+            <a:tailEnd type="arrow"/>
+          </a:ln>
+        </p:spPr>
+        <p:style>
+          <a:lnRef idx="2">
+            <a:schemeClr val="accent1"/>
+          </a:lnRef>
+          <a:fillRef idx="0">
+            <a:schemeClr val="accent1"/>
+          </a:fillRef>
+          <a:effectRef idx="1">
+            <a:schemeClr val="accent1"/>
+          </a:effectRef>
+          <a:fontRef idx="minor">
+            <a:schemeClr val="tx1"/>
+          </a:fontRef>
+        </p:style>
+      </p:cxnSp>
+      <p:cxnSp>
+        <p:nvCxnSpPr>
+          <p:cNvPr id="57" name="Straight Arrow Connector 56"/>
+          <p:cNvCxnSpPr/>
+          <p:nvPr/>
+        </p:nvCxnSpPr>
+        <p:spPr>
+          <a:xfrm rot="10800000">
+            <a:off x="5334000" y="4495800"/>
+            <a:ext cx="668758" cy="10646"/>
+          </a:xfrm>
+          <a:prstGeom prst="straightConnector1">
+            <a:avLst/>
+          </a:prstGeom>
+          <a:ln>
+            <a:solidFill>
+              <a:srgbClr val="000000"/>
+            </a:solidFill>
+            <a:tailEnd type="arrow"/>
+          </a:ln>
+        </p:spPr>
+        <p:style>
+          <a:lnRef idx="2">
+            <a:schemeClr val="accent1"/>
+          </a:lnRef>
+          <a:fillRef idx="0">
+            <a:schemeClr val="accent1"/>
+          </a:fillRef>
+          <a:effectRef idx="1">
+            <a:schemeClr val="accent1"/>
+          </a:effectRef>
+          <a:fontRef idx="minor">
+            <a:schemeClr val="tx1"/>
+          </a:fontRef>
+        </p:style>
+      </p:cxnSp>
+      <p:cxnSp>
+        <p:nvCxnSpPr>
+          <p:cNvPr id="59" name="Straight Arrow Connector 58"/>
+          <p:cNvCxnSpPr>
+            <a:stCxn id="22" idx="0"/>
+            <a:endCxn id="21" idx="2"/>
+          </p:cNvCxnSpPr>
+          <p:nvPr/>
+        </p:nvCxnSpPr>
+        <p:spPr>
+          <a:xfrm rot="5400000" flipH="1" flipV="1">
+            <a:off x="3660713" y="3265100"/>
+            <a:ext cx="1699400" cy="1588"/>
+          </a:xfrm>
+          <a:prstGeom prst="straightConnector1">
+            <a:avLst/>
+          </a:prstGeom>
+          <a:ln>
+            <a:solidFill>
+              <a:srgbClr val="000000"/>
+            </a:solidFill>
+            <a:tailEnd type="arrow"/>
+          </a:ln>
+        </p:spPr>
+        <p:style>
+          <a:lnRef idx="2">
+            <a:schemeClr val="accent1"/>
+          </a:lnRef>
+          <a:fillRef idx="0">
+            <a:schemeClr val="accent1"/>
+          </a:fillRef>
+          <a:effectRef idx="1">
+            <a:schemeClr val="accent1"/>
+          </a:effectRef>
+          <a:fontRef idx="minor">
+            <a:schemeClr val="tx1"/>
+          </a:fontRef>
+        </p:style>
+      </p:cxnSp>
+      <p:cxnSp>
+        <p:nvCxnSpPr>
+          <p:cNvPr id="62" name="Straight Arrow Connector 61"/>
+          <p:cNvCxnSpPr>
+            <a:stCxn id="12" idx="3"/>
+          </p:cNvCxnSpPr>
+          <p:nvPr/>
+        </p:nvCxnSpPr>
+        <p:spPr>
+          <a:xfrm rot="5400000" flipH="1" flipV="1">
+            <a:off x="416526" y="2098074"/>
+            <a:ext cx="1224348" cy="838200"/>
+          </a:xfrm>
+          <a:prstGeom prst="straightConnector1">
+            <a:avLst/>
+          </a:prstGeom>
+          <a:ln>
+            <a:solidFill>
+              <a:srgbClr val="000000"/>
+            </a:solidFill>
+            <a:tailEnd type="arrow"/>
+          </a:ln>
+        </p:spPr>
+        <p:style>
+          <a:lnRef idx="2">
+            <a:schemeClr val="accent1"/>
+          </a:lnRef>
+          <a:fillRef idx="0">
+            <a:schemeClr val="accent1"/>
+          </a:fillRef>
+          <a:effectRef idx="1">
+            <a:schemeClr val="accent1"/>
+          </a:effectRef>
+          <a:fontRef idx="minor">
+            <a:schemeClr val="tx1"/>
+          </a:fontRef>
+        </p:style>
+      </p:cxnSp>
+      <p:cxnSp>
+        <p:nvCxnSpPr>
+          <p:cNvPr id="64" name="Straight Arrow Connector 63"/>
+          <p:cNvCxnSpPr>
+            <a:stCxn id="20" idx="1"/>
+            <a:endCxn id="12" idx="1"/>
+          </p:cNvCxnSpPr>
+          <p:nvPr/>
+        </p:nvCxnSpPr>
+        <p:spPr>
+          <a:xfrm rot="10800000">
+            <a:off x="609600" y="3962400"/>
+            <a:ext cx="685800" cy="849700"/>
+          </a:xfrm>
+          <a:prstGeom prst="straightConnector1">
+            <a:avLst/>
+          </a:prstGeom>
+          <a:ln>
+            <a:solidFill>
+              <a:srgbClr val="000000"/>
+            </a:solidFill>
+            <a:tailEnd type="arrow"/>
+          </a:ln>
+        </p:spPr>
+        <p:style>
+          <a:lnRef idx="2">
+            <a:schemeClr val="accent1"/>
+          </a:lnRef>
+          <a:fillRef idx="0">
+            <a:schemeClr val="accent1"/>
+          </a:fillRef>
+          <a:effectRef idx="1">
+            <a:schemeClr val="accent1"/>
+          </a:effectRef>
+          <a:fontRef idx="minor">
+            <a:schemeClr val="tx1"/>
+          </a:fontRef>
+        </p:style>
+      </p:cxnSp>
+      <p:sp>
+        <p:nvSpPr>
+          <p:cNvPr id="68" name="TextBox 67"/>
+          <p:cNvSpPr txBox="1"/>
+          <p:nvPr/>
+        </p:nvSpPr>
+        <p:spPr>
+          <a:xfrm>
+            <a:off x="1371600" y="-76200"/>
+            <a:ext cx="1447800" cy="646331"/>
+          </a:xfrm>
+          <a:prstGeom prst="rect">
+            <a:avLst/>
+          </a:prstGeom>
+          <a:noFill/>
+        </p:spPr>
+        <p:txBody>
+          <a:bodyPr wrap="square" rtlCol="0">
+            <a:spAutoFit/>
+          </a:bodyPr>
+          <a:lstStyle/>
+          <a:p>
+            <a:pPr algn="ctr"/>
+            <a:r>
+              <a:rPr lang="en-US" dirty="0" smtClean="0"/>
+              <a:t>Request</a:t>
+            </a:r>
+          </a:p>
+          <a:p>
+            <a:pPr algn="ctr"/>
+            <a:r>
+              <a:rPr lang="en-US" dirty="0" smtClean="0"/>
+              <a:t>Processing</a:t>
+            </a:r>
+            <a:endParaRPr lang="en-US" dirty="0"/>
+          </a:p>
+        </p:txBody>
+      </p:sp>
+      <p:sp>
+        <p:nvSpPr>
+          <p:cNvPr id="69" name="TextBox 68"/>
+          <p:cNvSpPr txBox="1"/>
+          <p:nvPr/>
+        </p:nvSpPr>
+        <p:spPr>
+          <a:xfrm>
+            <a:off x="3733800" y="-76200"/>
+            <a:ext cx="1447800" cy="646331"/>
+          </a:xfrm>
+          <a:prstGeom prst="rect">
+            <a:avLst/>
+          </a:prstGeom>
+          <a:noFill/>
+        </p:spPr>
+        <p:txBody>
+          <a:bodyPr wrap="square" rtlCol="0">
+            <a:spAutoFit/>
+          </a:bodyPr>
+          <a:lstStyle/>
+          <a:p>
+            <a:pPr algn="ctr"/>
+            <a:r>
+              <a:rPr lang="en-US" dirty="0" smtClean="0"/>
+              <a:t>State</a:t>
+            </a:r>
+          </a:p>
+          <a:p>
+            <a:pPr algn="ctr"/>
+            <a:r>
+              <a:rPr lang="en-US" dirty="0" smtClean="0"/>
+              <a:t>Management</a:t>
+            </a:r>
+            <a:endParaRPr lang="en-US" dirty="0"/>
+          </a:p>
+        </p:txBody>
+      </p:sp>
+      <p:sp>
+        <p:nvSpPr>
+          <p:cNvPr id="70" name="TextBox 69"/>
+          <p:cNvSpPr txBox="1"/>
+          <p:nvPr/>
+        </p:nvSpPr>
+        <p:spPr>
+          <a:xfrm>
+            <a:off x="6172200" y="-76200"/>
+            <a:ext cx="1447800" cy="646331"/>
+          </a:xfrm>
+          <a:prstGeom prst="rect">
+            <a:avLst/>
+          </a:prstGeom>
+          <a:noFill/>
+        </p:spPr>
+        <p:txBody>
+          <a:bodyPr wrap="square" rtlCol="0">
+            <a:spAutoFit/>
+          </a:bodyPr>
+          <a:lstStyle/>
+          <a:p>
+            <a:pPr algn="ctr"/>
+            <a:r>
+              <a:rPr lang="en-US" dirty="0" smtClean="0"/>
+              <a:t>Resource</a:t>
+            </a:r>
+          </a:p>
+          <a:p>
+            <a:pPr algn="ctr"/>
+            <a:r>
+              <a:rPr lang="en-US" dirty="0" smtClean="0"/>
+              <a:t>Control</a:t>
+            </a:r>
+            <a:endParaRPr lang="en-US" dirty="0"/>
+          </a:p>
+        </p:txBody>
+      </p:sp>
+      <p:sp>
+        <p:nvSpPr>
+          <p:cNvPr id="71" name="TextBox 70"/>
+          <p:cNvSpPr txBox="1"/>
+          <p:nvPr/>
+        </p:nvSpPr>
+        <p:spPr>
+          <a:xfrm>
+            <a:off x="8001000" y="3124200"/>
+            <a:ext cx="1179793" cy="369332"/>
+          </a:xfrm>
+          <a:prstGeom prst="rect">
+            <a:avLst/>
+          </a:prstGeom>
+          <a:noFill/>
+        </p:spPr>
+        <p:txBody>
+          <a:bodyPr wrap="square" rtlCol="0">
+            <a:spAutoFit/>
+          </a:bodyPr>
+          <a:lstStyle/>
+          <a:p>
+            <a:r>
+              <a:rPr lang="en-US" dirty="0" smtClean="0"/>
+              <a:t>Resource</a:t>
+            </a:r>
+            <a:endParaRPr lang="en-US" dirty="0"/>
+          </a:p>
+        </p:txBody>
+      </p:sp>
+    </p:spTree>
+  </p:cSld>
+  <p:clrMapOvr>
+    <a:masterClrMapping/>
+  </p:clrMapOvr>
+  <p:timing>
+    <p:tnLst>
+      <p:par>
+        <p:cTn id="1" dur="indefinite" restart="never" nodeType="tmRoot"/>
+      </p:par>
+    </p:tnLst>
+  </p:timing>
 </p:sld>
 </file>
 

</xml_diff>

<commit_message>
changes the service message figure
</commit_message>
<xml_diff>
--- a/service-architecture/diagrams/message-flow-diagrams.pptx
+++ b/service-architecture/diagrams/message-flow-diagrams.pptx
@@ -293,7 +293,7 @@
             <a:fld id="{51A32DD6-18F2-0144-A5D4-11CF5A8BD230}" type="datetimeFigureOut">
               <a:rPr lang="en-US" smtClean="0"/>
               <a:pPr/>
-              <a:t>10/2/12</a:t>
+              <a:t>10/3/12</a:t>
             </a:fld>
             <a:endParaRPr lang="en-US"/>
           </a:p>
@@ -460,7 +460,7 @@
             <a:fld id="{51A32DD6-18F2-0144-A5D4-11CF5A8BD230}" type="datetimeFigureOut">
               <a:rPr lang="en-US" smtClean="0"/>
               <a:pPr/>
-              <a:t>10/2/12</a:t>
+              <a:t>10/3/12</a:t>
             </a:fld>
             <a:endParaRPr lang="en-US"/>
           </a:p>
@@ -637,7 +637,7 @@
             <a:fld id="{51A32DD6-18F2-0144-A5D4-11CF5A8BD230}" type="datetimeFigureOut">
               <a:rPr lang="en-US" smtClean="0"/>
               <a:pPr/>
-              <a:t>10/2/12</a:t>
+              <a:t>10/3/12</a:t>
             </a:fld>
             <a:endParaRPr lang="en-US"/>
           </a:p>
@@ -804,7 +804,7 @@
             <a:fld id="{51A32DD6-18F2-0144-A5D4-11CF5A8BD230}" type="datetimeFigureOut">
               <a:rPr lang="en-US" smtClean="0"/>
               <a:pPr/>
-              <a:t>10/2/12</a:t>
+              <a:t>10/3/12</a:t>
             </a:fld>
             <a:endParaRPr lang="en-US"/>
           </a:p>
@@ -1047,7 +1047,7 @@
             <a:fld id="{51A32DD6-18F2-0144-A5D4-11CF5A8BD230}" type="datetimeFigureOut">
               <a:rPr lang="en-US" smtClean="0"/>
               <a:pPr/>
-              <a:t>10/2/12</a:t>
+              <a:t>10/3/12</a:t>
             </a:fld>
             <a:endParaRPr lang="en-US"/>
           </a:p>
@@ -1332,7 +1332,7 @@
             <a:fld id="{51A32DD6-18F2-0144-A5D4-11CF5A8BD230}" type="datetimeFigureOut">
               <a:rPr lang="en-US" smtClean="0"/>
               <a:pPr/>
-              <a:t>10/2/12</a:t>
+              <a:t>10/3/12</a:t>
             </a:fld>
             <a:endParaRPr lang="en-US"/>
           </a:p>
@@ -1751,7 +1751,7 @@
             <a:fld id="{51A32DD6-18F2-0144-A5D4-11CF5A8BD230}" type="datetimeFigureOut">
               <a:rPr lang="en-US" smtClean="0"/>
               <a:pPr/>
-              <a:t>10/2/12</a:t>
+              <a:t>10/3/12</a:t>
             </a:fld>
             <a:endParaRPr lang="en-US"/>
           </a:p>
@@ -1866,7 +1866,7 @@
             <a:fld id="{51A32DD6-18F2-0144-A5D4-11CF5A8BD230}" type="datetimeFigureOut">
               <a:rPr lang="en-US" smtClean="0"/>
               <a:pPr/>
-              <a:t>10/2/12</a:t>
+              <a:t>10/3/12</a:t>
             </a:fld>
             <a:endParaRPr lang="en-US"/>
           </a:p>
@@ -1958,7 +1958,7 @@
             <a:fld id="{51A32DD6-18F2-0144-A5D4-11CF5A8BD230}" type="datetimeFigureOut">
               <a:rPr lang="en-US" smtClean="0"/>
               <a:pPr/>
-              <a:t>10/2/12</a:t>
+              <a:t>10/3/12</a:t>
             </a:fld>
             <a:endParaRPr lang="en-US"/>
           </a:p>
@@ -2232,7 +2232,7 @@
             <a:fld id="{51A32DD6-18F2-0144-A5D4-11CF5A8BD230}" type="datetimeFigureOut">
               <a:rPr lang="en-US" smtClean="0"/>
               <a:pPr/>
-              <a:t>10/2/12</a:t>
+              <a:t>10/3/12</a:t>
             </a:fld>
             <a:endParaRPr lang="en-US"/>
           </a:p>
@@ -2482,7 +2482,7 @@
             <a:fld id="{51A32DD6-18F2-0144-A5D4-11CF5A8BD230}" type="datetimeFigureOut">
               <a:rPr lang="en-US" smtClean="0"/>
               <a:pPr/>
-              <a:t>10/2/12</a:t>
+              <a:t>10/3/12</a:t>
             </a:fld>
             <a:endParaRPr lang="en-US"/>
           </a:p>
@@ -2692,7 +2692,7 @@
             <a:fld id="{51A32DD6-18F2-0144-A5D4-11CF5A8BD230}" type="datetimeFigureOut">
               <a:rPr lang="en-US" smtClean="0"/>
               <a:pPr/>
-              <a:t>10/2/12</a:t>
+              <a:t>10/3/12</a:t>
             </a:fld>
             <a:endParaRPr lang="en-US"/>
           </a:p>
@@ -5973,7 +5973,7 @@
           </a:prstGeom>
           <a:ln w="57150" cap="flat" cmpd="sng" algn="ctr">
             <a:solidFill>
-              <a:schemeClr val="tx1"/>
+              <a:srgbClr val="800000"/>
             </a:solidFill>
             <a:prstDash val="solid"/>
             <a:round/>
@@ -6123,24 +6123,14 @@
           </a:p>
           <a:p>
             <a:pPr algn="ctr"/>
-            <a:r>
-              <a:rPr lang="en-US" dirty="0" smtClean="0"/>
-              <a:t/>
-            </a:r>
+            <a:endParaRPr/>
           </a:p>
           <a:p>
             <a:pPr algn="ctr"/>
-            <a:r>
-              <a:rPr lang="en-US" dirty="0" smtClean="0"/>
-              <a:t/>
-            </a:r>
+            <a:endParaRPr/>
           </a:p>
           <a:p>
             <a:pPr algn="ctr"/>
-            <a:r>
-              <a:rPr lang="en-US" dirty="0" smtClean="0"/>
-              <a:t/>
-            </a:r>
             <a:endParaRPr lang="en-US" dirty="0"/>
           </a:p>
         </p:txBody>
@@ -6243,24 +6233,14 @@
           </a:p>
           <a:p>
             <a:pPr algn="ctr"/>
-            <a:r>
-              <a:rPr lang="en-US" dirty="0" smtClean="0"/>
-              <a:t/>
-            </a:r>
+            <a:endParaRPr/>
           </a:p>
           <a:p>
             <a:pPr algn="ctr"/>
-            <a:r>
-              <a:rPr lang="en-US" dirty="0" smtClean="0"/>
-              <a:t/>
-            </a:r>
+            <a:endParaRPr/>
           </a:p>
           <a:p>
             <a:pPr algn="ctr"/>
-            <a:r>
-              <a:rPr lang="en-US" dirty="0" smtClean="0"/>
-              <a:t/>
-            </a:r>
             <a:endParaRPr lang="en-US" dirty="0"/>
           </a:p>
         </p:txBody>
@@ -6318,24 +6298,14 @@
           </a:p>
           <a:p>
             <a:pPr algn="ctr"/>
-            <a:r>
-              <a:rPr lang="en-US" dirty="0" smtClean="0"/>
-              <a:t/>
-            </a:r>
+            <a:endParaRPr/>
           </a:p>
           <a:p>
             <a:pPr algn="ctr"/>
-            <a:r>
-              <a:rPr lang="en-US" dirty="0" smtClean="0"/>
-              <a:t/>
-            </a:r>
+            <a:endParaRPr/>
           </a:p>
           <a:p>
             <a:pPr algn="ctr"/>
-            <a:r>
-              <a:rPr lang="en-US" dirty="0" smtClean="0"/>
-              <a:t/>
-            </a:r>
             <a:endParaRPr lang="en-US" dirty="0"/>
           </a:p>
         </p:txBody>
@@ -6818,7 +6788,7 @@
           </a:prstGeom>
           <a:ln>
             <a:solidFill>
-              <a:srgbClr val="000000"/>
+              <a:srgbClr val="800000"/>
             </a:solidFill>
             <a:tailEnd type="arrow"/>
           </a:ln>
@@ -6879,45 +6849,6 @@
       </p:cxnSp>
       <p:cxnSp>
         <p:nvCxnSpPr>
-          <p:cNvPr id="46" name="Straight Arrow Connector 45"/>
-          <p:cNvCxnSpPr>
-            <a:stCxn id="19" idx="3"/>
-          </p:cNvCxnSpPr>
-          <p:nvPr/>
-        </p:nvCxnSpPr>
-        <p:spPr>
-          <a:xfrm flipV="1">
-            <a:off x="3001026" y="2362200"/>
-            <a:ext cx="656574" cy="849700"/>
-          </a:xfrm>
-          <a:prstGeom prst="straightConnector1">
-            <a:avLst/>
-          </a:prstGeom>
-          <a:ln>
-            <a:solidFill>
-              <a:srgbClr val="000000"/>
-            </a:solidFill>
-            <a:headEnd type="arrow"/>
-            <a:tailEnd type="arrow"/>
-          </a:ln>
-        </p:spPr>
-        <p:style>
-          <a:lnRef idx="2">
-            <a:schemeClr val="accent1"/>
-          </a:lnRef>
-          <a:fillRef idx="0">
-            <a:schemeClr val="accent1"/>
-          </a:fillRef>
-          <a:effectRef idx="1">
-            <a:schemeClr val="accent1"/>
-          </a:effectRef>
-          <a:fontRef idx="minor">
-            <a:schemeClr val="tx1"/>
-          </a:fontRef>
-        </p:style>
-      </p:cxnSp>
-      <p:cxnSp>
-        <p:nvCxnSpPr>
           <p:cNvPr id="57" name="Straight Arrow Connector 56"/>
           <p:cNvCxnSpPr/>
           <p:nvPr/>
@@ -7009,7 +6940,7 @@
           </a:prstGeom>
           <a:ln>
             <a:solidFill>
-              <a:srgbClr val="000000"/>
+              <a:srgbClr val="800000"/>
             </a:solidFill>
             <a:tailEnd type="arrow"/>
           </a:ln>
@@ -7048,7 +6979,7 @@
           </a:prstGeom>
           <a:ln>
             <a:solidFill>
-              <a:srgbClr val="000000"/>
+              <a:srgbClr val="800000"/>
             </a:solidFill>
             <a:tailEnd type="arrow"/>
           </a:ln>
@@ -7212,6 +7143,47 @@
           </a:p>
         </p:txBody>
       </p:sp>
+      <p:cxnSp>
+        <p:nvCxnSpPr>
+          <p:cNvPr id="32" name="Straight Arrow Connector 31"/>
+          <p:cNvCxnSpPr/>
+          <p:nvPr/>
+        </p:nvCxnSpPr>
+        <p:spPr>
+          <a:xfrm rot="5400000">
+            <a:off x="2778726" y="2250474"/>
+            <a:ext cx="919548" cy="838200"/>
+          </a:xfrm>
+          <a:prstGeom prst="straightConnector1">
+            <a:avLst/>
+          </a:prstGeom>
+          <a:ln w="76200" cap="flat" cmpd="sng" algn="ctr">
+            <a:solidFill>
+              <a:schemeClr val="accent3">
+                <a:lumMod val="50000"/>
+              </a:schemeClr>
+            </a:solidFill>
+            <a:prstDash val="solid"/>
+            <a:round/>
+            <a:headEnd type="none" w="med" len="med"/>
+            <a:tailEnd type="arrow" w="med" len="med"/>
+          </a:ln>
+        </p:spPr>
+        <p:style>
+          <a:lnRef idx="2">
+            <a:schemeClr val="accent1"/>
+          </a:lnRef>
+          <a:fillRef idx="0">
+            <a:schemeClr val="accent1"/>
+          </a:fillRef>
+          <a:effectRef idx="1">
+            <a:schemeClr val="accent1"/>
+          </a:effectRef>
+          <a:fontRef idx="minor">
+            <a:schemeClr val="tx1"/>
+          </a:fontRef>
+        </p:style>
+      </p:cxnSp>
     </p:spTree>
   </p:cSld>
   <p:clrMapOvr>

</xml_diff>

<commit_message>
new diagram for web service stack
</commit_message>
<xml_diff>
--- a/service-architecture/diagrams/message-flow-diagrams.pptx
+++ b/service-architecture/diagrams/message-flow-diagrams.pptx
@@ -9,7 +9,8 @@
     <p:sldId id="257" r:id="rId3"/>
     <p:sldId id="258" r:id="rId4"/>
     <p:sldId id="259" r:id="rId5"/>
-    <p:sldId id="260" r:id="rId6"/>
+    <p:sldId id="261" r:id="rId6"/>
+    <p:sldId id="260" r:id="rId7"/>
   </p:sldIdLst>
   <p:sldSz cx="9144000" cy="6858000" type="screen4x3"/>
   <p:notesSz cx="6858000" cy="9144000"/>
@@ -5193,6 +5194,44 @@
           </a:fontRef>
         </p:style>
       </p:cxnSp>
+      <p:sp>
+        <p:nvSpPr>
+          <p:cNvPr id="54" name="TextBox 53"/>
+          <p:cNvSpPr txBox="1"/>
+          <p:nvPr/>
+        </p:nvSpPr>
+        <p:spPr>
+          <a:xfrm>
+            <a:off x="6248400" y="175081"/>
+            <a:ext cx="2494343" cy="830997"/>
+          </a:xfrm>
+          <a:prstGeom prst="rect">
+            <a:avLst/>
+          </a:prstGeom>
+          <a:noFill/>
+        </p:spPr>
+        <p:txBody>
+          <a:bodyPr wrap="none" rtlCol="0">
+            <a:spAutoFit/>
+          </a:bodyPr>
+          <a:lstStyle/>
+          <a:p>
+            <a:pPr algn="ctr"/>
+            <a:r>
+              <a:rPr lang="en-US" sz="2400" smtClean="0"/>
+              <a:t>Eucalyptus Service</a:t>
+            </a:r>
+          </a:p>
+          <a:p>
+            <a:pPr algn="ctr"/>
+            <a:r>
+              <a:rPr lang="en-US" sz="2400" dirty="0" smtClean="0"/>
+              <a:t>Architecture</a:t>
+            </a:r>
+            <a:endParaRPr lang="en-US" sz="2400" dirty="0"/>
+          </a:p>
+        </p:txBody>
+      </p:sp>
     </p:spTree>
   </p:cSld>
   <p:clrMapOvr>
@@ -5929,6 +5968,44 @@
           </a:p>
         </p:txBody>
       </p:sp>
+      <p:sp>
+        <p:nvSpPr>
+          <p:cNvPr id="15" name="TextBox 14"/>
+          <p:cNvSpPr txBox="1"/>
+          <p:nvPr/>
+        </p:nvSpPr>
+        <p:spPr>
+          <a:xfrm>
+            <a:off x="1365127" y="5867400"/>
+            <a:ext cx="3261680" cy="830997"/>
+          </a:xfrm>
+          <a:prstGeom prst="rect">
+            <a:avLst/>
+          </a:prstGeom>
+          <a:noFill/>
+        </p:spPr>
+        <p:txBody>
+          <a:bodyPr wrap="none" rtlCol="0">
+            <a:spAutoFit/>
+          </a:bodyPr>
+          <a:lstStyle/>
+          <a:p>
+            <a:pPr algn="ctr"/>
+            <a:r>
+              <a:rPr lang="en-US" sz="2400" dirty="0" smtClean="0"/>
+              <a:t>Eucalyptus Web Services</a:t>
+            </a:r>
+          </a:p>
+          <a:p>
+            <a:pPr algn="ctr"/>
+            <a:r>
+              <a:rPr lang="en-US" sz="2400" dirty="0" smtClean="0"/>
+              <a:t>Object Stack</a:t>
+            </a:r>
+            <a:endParaRPr lang="en-US" sz="2400" dirty="0"/>
+          </a:p>
+        </p:txBody>
+      </p:sp>
     </p:spTree>
   </p:cSld>
   <p:clrMapOvr>
@@ -5956,6 +6033,967 @@
       </p:grpSpPr>
       <p:sp>
         <p:nvSpPr>
+          <p:cNvPr id="4" name="Process 3"/>
+          <p:cNvSpPr/>
+          <p:nvPr/>
+        </p:nvSpPr>
+        <p:spPr>
+          <a:xfrm>
+            <a:off x="2694524" y="2590816"/>
+            <a:ext cx="4792133" cy="355600"/>
+          </a:xfrm>
+          <a:prstGeom prst="flowChartProcess">
+            <a:avLst/>
+          </a:prstGeom>
+          <a:solidFill>
+            <a:schemeClr val="tx2"/>
+          </a:solidFill>
+          <a:ln>
+            <a:solidFill>
+              <a:schemeClr val="bg1"/>
+            </a:solidFill>
+          </a:ln>
+        </p:spPr>
+        <p:style>
+          <a:lnRef idx="1">
+            <a:schemeClr val="accent1"/>
+          </a:lnRef>
+          <a:fillRef idx="3">
+            <a:schemeClr val="accent1"/>
+          </a:fillRef>
+          <a:effectRef idx="2">
+            <a:schemeClr val="accent1"/>
+          </a:effectRef>
+          <a:fontRef idx="minor">
+            <a:schemeClr val="lt1"/>
+          </a:fontRef>
+        </p:style>
+        <p:txBody>
+          <a:bodyPr rtlCol="0" anchor="ctr"/>
+          <a:lstStyle/>
+          <a:p>
+            <a:pPr algn="ctr"/>
+            <a:r>
+              <a:rPr lang="en-US" dirty="0" smtClean="0"/>
+              <a:t>Service Context Dispatch</a:t>
+            </a:r>
+          </a:p>
+        </p:txBody>
+      </p:sp>
+      <p:sp>
+        <p:nvSpPr>
+          <p:cNvPr id="5" name="Process 4"/>
+          <p:cNvSpPr/>
+          <p:nvPr/>
+        </p:nvSpPr>
+        <p:spPr>
+          <a:xfrm>
+            <a:off x="2694524" y="2940770"/>
+            <a:ext cx="4792133" cy="355600"/>
+          </a:xfrm>
+          <a:prstGeom prst="flowChartProcess">
+            <a:avLst/>
+          </a:prstGeom>
+          <a:solidFill>
+            <a:schemeClr val="tx2"/>
+          </a:solidFill>
+          <a:ln>
+            <a:solidFill>
+              <a:schemeClr val="bg1"/>
+            </a:solidFill>
+          </a:ln>
+        </p:spPr>
+        <p:style>
+          <a:lnRef idx="1">
+            <a:schemeClr val="accent1"/>
+          </a:lnRef>
+          <a:fillRef idx="3">
+            <a:schemeClr val="accent1"/>
+          </a:fillRef>
+          <a:effectRef idx="2">
+            <a:schemeClr val="accent1"/>
+          </a:effectRef>
+          <a:fontRef idx="minor">
+            <a:schemeClr val="lt1"/>
+          </a:fontRef>
+        </p:style>
+        <p:txBody>
+          <a:bodyPr rtlCol="0" anchor="ctr"/>
+          <a:lstStyle/>
+          <a:p>
+            <a:pPr algn="ctr"/>
+            <a:r>
+              <a:rPr lang="en-US" dirty="0" smtClean="0"/>
+              <a:t>Service State Checks</a:t>
+            </a:r>
+          </a:p>
+        </p:txBody>
+      </p:sp>
+      <p:sp>
+        <p:nvSpPr>
+          <p:cNvPr id="6" name="Process 5"/>
+          <p:cNvSpPr/>
+          <p:nvPr/>
+        </p:nvSpPr>
+        <p:spPr>
+          <a:xfrm>
+            <a:off x="2694524" y="3290724"/>
+            <a:ext cx="4792133" cy="355600"/>
+          </a:xfrm>
+          <a:prstGeom prst="flowChartProcess">
+            <a:avLst/>
+          </a:prstGeom>
+          <a:solidFill>
+            <a:schemeClr val="accent1"/>
+          </a:solidFill>
+          <a:ln>
+            <a:solidFill>
+              <a:schemeClr val="bg1"/>
+            </a:solidFill>
+          </a:ln>
+        </p:spPr>
+        <p:style>
+          <a:lnRef idx="1">
+            <a:schemeClr val="accent1"/>
+          </a:lnRef>
+          <a:fillRef idx="3">
+            <a:schemeClr val="accent1"/>
+          </a:fillRef>
+          <a:effectRef idx="2">
+            <a:schemeClr val="accent1"/>
+          </a:effectRef>
+          <a:fontRef idx="minor">
+            <a:schemeClr val="lt1"/>
+          </a:fontRef>
+        </p:style>
+        <p:txBody>
+          <a:bodyPr rtlCol="0" anchor="ctr"/>
+          <a:lstStyle/>
+          <a:p>
+            <a:pPr algn="ctr"/>
+            <a:r>
+              <a:rPr lang="en-US" dirty="0" smtClean="0"/>
+              <a:t>Binding</a:t>
+            </a:r>
+          </a:p>
+        </p:txBody>
+      </p:sp>
+      <p:sp>
+        <p:nvSpPr>
+          <p:cNvPr id="7" name="Process 6"/>
+          <p:cNvSpPr/>
+          <p:nvPr/>
+        </p:nvSpPr>
+        <p:spPr>
+          <a:xfrm>
+            <a:off x="2694524" y="3640678"/>
+            <a:ext cx="4792133" cy="355600"/>
+          </a:xfrm>
+          <a:prstGeom prst="flowChartProcess">
+            <a:avLst/>
+          </a:prstGeom>
+          <a:solidFill>
+            <a:schemeClr val="accent1"/>
+          </a:solidFill>
+          <a:ln>
+            <a:solidFill>
+              <a:schemeClr val="bg1"/>
+            </a:solidFill>
+          </a:ln>
+        </p:spPr>
+        <p:style>
+          <a:lnRef idx="1">
+            <a:schemeClr val="accent1"/>
+          </a:lnRef>
+          <a:fillRef idx="3">
+            <a:schemeClr val="accent1"/>
+          </a:fillRef>
+          <a:effectRef idx="2">
+            <a:schemeClr val="accent1"/>
+          </a:effectRef>
+          <a:fontRef idx="minor">
+            <a:schemeClr val="lt1"/>
+          </a:fontRef>
+        </p:style>
+        <p:txBody>
+          <a:bodyPr rtlCol="0" anchor="ctr"/>
+          <a:lstStyle/>
+          <a:p>
+            <a:pPr algn="ctr"/>
+            <a:r>
+              <a:rPr lang="en-US" dirty="0" smtClean="0"/>
+              <a:t>WS-Security</a:t>
+            </a:r>
+          </a:p>
+        </p:txBody>
+      </p:sp>
+      <p:sp>
+        <p:nvSpPr>
+          <p:cNvPr id="8" name="Process 7"/>
+          <p:cNvSpPr/>
+          <p:nvPr/>
+        </p:nvSpPr>
+        <p:spPr>
+          <a:xfrm>
+            <a:off x="2694524" y="3990632"/>
+            <a:ext cx="4792133" cy="355600"/>
+          </a:xfrm>
+          <a:prstGeom prst="flowChartProcess">
+            <a:avLst/>
+          </a:prstGeom>
+          <a:solidFill>
+            <a:schemeClr val="accent1"/>
+          </a:solidFill>
+          <a:ln>
+            <a:solidFill>
+              <a:schemeClr val="bg1"/>
+            </a:solidFill>
+          </a:ln>
+        </p:spPr>
+        <p:style>
+          <a:lnRef idx="1">
+            <a:schemeClr val="accent1"/>
+          </a:lnRef>
+          <a:fillRef idx="3">
+            <a:schemeClr val="accent1"/>
+          </a:fillRef>
+          <a:effectRef idx="2">
+            <a:schemeClr val="accent1"/>
+          </a:effectRef>
+          <a:fontRef idx="minor">
+            <a:schemeClr val="lt1"/>
+          </a:fontRef>
+        </p:style>
+        <p:txBody>
+          <a:bodyPr rtlCol="0" anchor="ctr"/>
+          <a:lstStyle/>
+          <a:p>
+            <a:pPr algn="ctr"/>
+            <a:r>
+              <a:rPr lang="en-US" dirty="0" smtClean="0"/>
+              <a:t>SOAP Envelope Processing</a:t>
+            </a:r>
+          </a:p>
+        </p:txBody>
+      </p:sp>
+      <p:sp>
+        <p:nvSpPr>
+          <p:cNvPr id="9" name="Process 8"/>
+          <p:cNvSpPr/>
+          <p:nvPr/>
+        </p:nvSpPr>
+        <p:spPr>
+          <a:xfrm>
+            <a:off x="2694524" y="4340586"/>
+            <a:ext cx="4792133" cy="355600"/>
+          </a:xfrm>
+          <a:prstGeom prst="flowChartProcess">
+            <a:avLst/>
+          </a:prstGeom>
+          <a:solidFill>
+            <a:schemeClr val="accent1"/>
+          </a:solidFill>
+          <a:ln>
+            <a:solidFill>
+              <a:schemeClr val="bg1"/>
+            </a:solidFill>
+          </a:ln>
+        </p:spPr>
+        <p:style>
+          <a:lnRef idx="1">
+            <a:schemeClr val="accent1"/>
+          </a:lnRef>
+          <a:fillRef idx="3">
+            <a:schemeClr val="accent1"/>
+          </a:fillRef>
+          <a:effectRef idx="2">
+            <a:schemeClr val="accent1"/>
+          </a:effectRef>
+          <a:fontRef idx="minor">
+            <a:schemeClr val="lt1"/>
+          </a:fontRef>
+        </p:style>
+        <p:txBody>
+          <a:bodyPr rtlCol="0" anchor="ctr"/>
+          <a:lstStyle/>
+          <a:p>
+            <a:pPr algn="ctr"/>
+            <a:r>
+              <a:rPr lang="en-US" dirty="0" smtClean="0"/>
+              <a:t>SOAP Unmarshalling/Marshalling </a:t>
+            </a:r>
+            <a:endParaRPr lang="en-US" dirty="0"/>
+          </a:p>
+        </p:txBody>
+      </p:sp>
+      <p:sp>
+        <p:nvSpPr>
+          <p:cNvPr id="10" name="Process 9"/>
+          <p:cNvSpPr/>
+          <p:nvPr/>
+        </p:nvSpPr>
+        <p:spPr>
+          <a:xfrm>
+            <a:off x="2694524" y="4690540"/>
+            <a:ext cx="4792133" cy="355600"/>
+          </a:xfrm>
+          <a:prstGeom prst="flowChartProcess">
+            <a:avLst/>
+          </a:prstGeom>
+          <a:solidFill>
+            <a:schemeClr val="tx2"/>
+          </a:solidFill>
+          <a:ln>
+            <a:solidFill>
+              <a:schemeClr val="bg1"/>
+            </a:solidFill>
+          </a:ln>
+        </p:spPr>
+        <p:style>
+          <a:lnRef idx="1">
+            <a:schemeClr val="accent1"/>
+          </a:lnRef>
+          <a:fillRef idx="3">
+            <a:schemeClr val="accent1"/>
+          </a:fillRef>
+          <a:effectRef idx="2">
+            <a:schemeClr val="accent1"/>
+          </a:effectRef>
+          <a:fontRef idx="minor">
+            <a:schemeClr val="lt1"/>
+          </a:fontRef>
+        </p:style>
+        <p:txBody>
+          <a:bodyPr rtlCol="0" anchor="ctr"/>
+          <a:lstStyle/>
+          <a:p>
+            <a:pPr algn="ctr"/>
+            <a:r>
+              <a:rPr lang="en-US" dirty="0" smtClean="0"/>
+              <a:t>Protocol Selection</a:t>
+            </a:r>
+            <a:endParaRPr lang="en-US" dirty="0"/>
+          </a:p>
+        </p:txBody>
+      </p:sp>
+      <p:sp>
+        <p:nvSpPr>
+          <p:cNvPr id="11" name="Process 10"/>
+          <p:cNvSpPr/>
+          <p:nvPr/>
+        </p:nvSpPr>
+        <p:spPr>
+          <a:xfrm>
+            <a:off x="2694524" y="5040494"/>
+            <a:ext cx="4792133" cy="355600"/>
+          </a:xfrm>
+          <a:prstGeom prst="flowChartProcess">
+            <a:avLst/>
+          </a:prstGeom>
+          <a:solidFill>
+            <a:schemeClr val="tx2"/>
+          </a:solidFill>
+          <a:ln>
+            <a:solidFill>
+              <a:schemeClr val="bg1"/>
+            </a:solidFill>
+          </a:ln>
+        </p:spPr>
+        <p:style>
+          <a:lnRef idx="1">
+            <a:schemeClr val="accent1"/>
+          </a:lnRef>
+          <a:fillRef idx="3">
+            <a:schemeClr val="accent1"/>
+          </a:fillRef>
+          <a:effectRef idx="2">
+            <a:schemeClr val="accent1"/>
+          </a:effectRef>
+          <a:fontRef idx="minor">
+            <a:schemeClr val="lt1"/>
+          </a:fontRef>
+        </p:style>
+        <p:txBody>
+          <a:bodyPr rtlCol="0" anchor="ctr"/>
+          <a:lstStyle/>
+          <a:p>
+            <a:pPr algn="ctr"/>
+            <a:r>
+              <a:rPr lang="en-US" dirty="0" smtClean="0"/>
+              <a:t>HTTP Chunking</a:t>
+            </a:r>
+            <a:endParaRPr lang="en-US" dirty="0"/>
+          </a:p>
+        </p:txBody>
+      </p:sp>
+      <p:sp>
+        <p:nvSpPr>
+          <p:cNvPr id="12" name="Process 11"/>
+          <p:cNvSpPr/>
+          <p:nvPr/>
+        </p:nvSpPr>
+        <p:spPr>
+          <a:xfrm>
+            <a:off x="2694524" y="5390448"/>
+            <a:ext cx="4792133" cy="355600"/>
+          </a:xfrm>
+          <a:prstGeom prst="flowChartProcess">
+            <a:avLst/>
+          </a:prstGeom>
+          <a:solidFill>
+            <a:schemeClr val="tx2"/>
+          </a:solidFill>
+          <a:ln>
+            <a:solidFill>
+              <a:schemeClr val="bg1"/>
+            </a:solidFill>
+          </a:ln>
+        </p:spPr>
+        <p:style>
+          <a:lnRef idx="1">
+            <a:schemeClr val="accent1"/>
+          </a:lnRef>
+          <a:fillRef idx="3">
+            <a:schemeClr val="accent1"/>
+          </a:fillRef>
+          <a:effectRef idx="2">
+            <a:schemeClr val="accent1"/>
+          </a:effectRef>
+          <a:fontRef idx="minor">
+            <a:schemeClr val="lt1"/>
+          </a:fontRef>
+        </p:style>
+        <p:txBody>
+          <a:bodyPr rtlCol="0" anchor="ctr"/>
+          <a:lstStyle/>
+          <a:p>
+            <a:pPr algn="ctr"/>
+            <a:r>
+              <a:rPr lang="en-US" dirty="0" smtClean="0"/>
+              <a:t>HTTP Decoding/Encoding</a:t>
+            </a:r>
+            <a:endParaRPr lang="en-US" dirty="0"/>
+          </a:p>
+        </p:txBody>
+      </p:sp>
+      <p:sp>
+        <p:nvSpPr>
+          <p:cNvPr id="13" name="Title 5"/>
+          <p:cNvSpPr>
+            <a:spLocks noGrp="1"/>
+          </p:cNvSpPr>
+          <p:nvPr>
+            <p:ph type="title"/>
+          </p:nvPr>
+        </p:nvSpPr>
+        <p:spPr>
+          <a:xfrm>
+            <a:off x="314325" y="606425"/>
+            <a:ext cx="8524875" cy="1096864"/>
+          </a:xfrm>
+        </p:spPr>
+        <p:txBody>
+          <a:bodyPr>
+            <a:normAutofit fontScale="90000"/>
+          </a:bodyPr>
+          <a:lstStyle/>
+          <a:p>
+            <a:pPr algn="l"/>
+            <a:r>
+              <a:rPr lang="en-US" dirty="0" smtClean="0"/>
+              <a:t>Web Services</a:t>
+            </a:r>
+            <a:r>
+              <a:rPr lang="en-US" dirty="0" smtClean="0"/>
+              <a:t/>
+            </a:r>
+            <a:br>
+              <a:rPr lang="en-US" dirty="0" smtClean="0"/>
+            </a:br>
+            <a:r>
+              <a:rPr lang="en-US" dirty="0" smtClean="0"/>
+              <a:t>Communication</a:t>
+            </a:r>
+            <a:br>
+              <a:rPr lang="en-US" dirty="0" smtClean="0"/>
+            </a:br>
+            <a:r>
+              <a:rPr lang="en-US" dirty="0" smtClean="0"/>
+              <a:t>Stack </a:t>
+            </a:r>
+            <a:r>
+              <a:rPr lang="en-US" dirty="0" smtClean="0"/>
+              <a:t>(SOAP)</a:t>
+            </a:r>
+            <a:endParaRPr lang="en-US" dirty="0"/>
+          </a:p>
+        </p:txBody>
+      </p:sp>
+      <p:sp>
+        <p:nvSpPr>
+          <p:cNvPr id="14" name="Slide Number Placeholder 3"/>
+          <p:cNvSpPr>
+            <a:spLocks noGrp="1"/>
+          </p:cNvSpPr>
+          <p:nvPr>
+            <p:ph type="sldNum" sz="quarter" idx="12"/>
+          </p:nvPr>
+        </p:nvSpPr>
+        <p:spPr>
+          <a:xfrm>
+            <a:off x="256532" y="6465702"/>
+            <a:ext cx="454025" cy="309563"/>
+          </a:xfrm>
+        </p:spPr>
+        <p:txBody>
+          <a:bodyPr/>
+          <a:lstStyle/>
+          <a:p>
+            <a:fld id="{843CD65F-9BB8-4359-8B89-0390EA97433C}" type="slidenum">
+              <a:rPr lang="en-US" smtClean="0"/>
+              <a:pPr/>
+              <a:t>5</a:t>
+            </a:fld>
+            <a:endParaRPr lang="en-US"/>
+          </a:p>
+        </p:txBody>
+      </p:sp>
+      <p:sp>
+        <p:nvSpPr>
+          <p:cNvPr id="16" name="Process 15"/>
+          <p:cNvSpPr/>
+          <p:nvPr/>
+        </p:nvSpPr>
+        <p:spPr>
+          <a:xfrm>
+            <a:off x="2694524" y="5740400"/>
+            <a:ext cx="4792133" cy="355600"/>
+          </a:xfrm>
+          <a:prstGeom prst="flowChartProcess">
+            <a:avLst/>
+          </a:prstGeom>
+          <a:solidFill>
+            <a:schemeClr val="tx2"/>
+          </a:solidFill>
+          <a:ln>
+            <a:solidFill>
+              <a:schemeClr val="bg1"/>
+            </a:solidFill>
+          </a:ln>
+        </p:spPr>
+        <p:style>
+          <a:lnRef idx="1">
+            <a:schemeClr val="accent1"/>
+          </a:lnRef>
+          <a:fillRef idx="3">
+            <a:schemeClr val="accent1"/>
+          </a:fillRef>
+          <a:effectRef idx="2">
+            <a:schemeClr val="accent1"/>
+          </a:effectRef>
+          <a:fontRef idx="minor">
+            <a:schemeClr val="lt1"/>
+          </a:fontRef>
+        </p:style>
+        <p:txBody>
+          <a:bodyPr rtlCol="0" anchor="ctr"/>
+          <a:lstStyle/>
+          <a:p>
+            <a:pPr algn="ctr"/>
+            <a:r>
+              <a:rPr lang="en-US" dirty="0" smtClean="0"/>
+              <a:t>SSL Decoding/Encoding</a:t>
+            </a:r>
+            <a:endParaRPr lang="en-US" dirty="0"/>
+          </a:p>
+        </p:txBody>
+      </p:sp>
+      <p:sp>
+        <p:nvSpPr>
+          <p:cNvPr id="17" name="Oval 16"/>
+          <p:cNvSpPr/>
+          <p:nvPr/>
+        </p:nvSpPr>
+        <p:spPr>
+          <a:xfrm>
+            <a:off x="3168952" y="1778000"/>
+            <a:ext cx="1693334" cy="616857"/>
+          </a:xfrm>
+          <a:prstGeom prst="ellipse">
+            <a:avLst/>
+          </a:prstGeom>
+          <a:solidFill>
+            <a:schemeClr val="accent2"/>
+          </a:solidFill>
+        </p:spPr>
+        <p:style>
+          <a:lnRef idx="1">
+            <a:schemeClr val="accent1"/>
+          </a:lnRef>
+          <a:fillRef idx="3">
+            <a:schemeClr val="accent1"/>
+          </a:fillRef>
+          <a:effectRef idx="2">
+            <a:schemeClr val="accent1"/>
+          </a:effectRef>
+          <a:fontRef idx="minor">
+            <a:schemeClr val="lt1"/>
+          </a:fontRef>
+        </p:style>
+        <p:txBody>
+          <a:bodyPr rtlCol="0" anchor="ctr"/>
+          <a:lstStyle/>
+          <a:p>
+            <a:pPr algn="ctr"/>
+            <a:r>
+              <a:rPr lang="en-US" dirty="0" smtClean="0"/>
+              <a:t>Request Routing</a:t>
+            </a:r>
+            <a:endParaRPr lang="en-US" dirty="0"/>
+          </a:p>
+        </p:txBody>
+      </p:sp>
+      <p:sp>
+        <p:nvSpPr>
+          <p:cNvPr id="18" name="Oval 17"/>
+          <p:cNvSpPr/>
+          <p:nvPr/>
+        </p:nvSpPr>
+        <p:spPr>
+          <a:xfrm>
+            <a:off x="5401733" y="1785256"/>
+            <a:ext cx="1693334" cy="616857"/>
+          </a:xfrm>
+          <a:prstGeom prst="ellipse">
+            <a:avLst/>
+          </a:prstGeom>
+          <a:solidFill>
+            <a:schemeClr val="accent2"/>
+          </a:solidFill>
+        </p:spPr>
+        <p:style>
+          <a:lnRef idx="1">
+            <a:schemeClr val="accent1"/>
+          </a:lnRef>
+          <a:fillRef idx="3">
+            <a:schemeClr val="accent1"/>
+          </a:fillRef>
+          <a:effectRef idx="2">
+            <a:schemeClr val="accent1"/>
+          </a:effectRef>
+          <a:fontRef idx="minor">
+            <a:schemeClr val="lt1"/>
+          </a:fontRef>
+        </p:style>
+        <p:txBody>
+          <a:bodyPr rtlCol="0" anchor="ctr"/>
+          <a:lstStyle/>
+          <a:p>
+            <a:pPr algn="ctr"/>
+            <a:r>
+              <a:rPr lang="en-US" dirty="0" smtClean="0"/>
+              <a:t>Reply Handling</a:t>
+            </a:r>
+            <a:endParaRPr lang="en-US" dirty="0"/>
+          </a:p>
+        </p:txBody>
+      </p:sp>
+      <p:sp>
+        <p:nvSpPr>
+          <p:cNvPr id="19" name="Oval 18"/>
+          <p:cNvSpPr/>
+          <p:nvPr/>
+        </p:nvSpPr>
+        <p:spPr>
+          <a:xfrm>
+            <a:off x="4083350" y="720876"/>
+            <a:ext cx="2097315" cy="766839"/>
+          </a:xfrm>
+          <a:prstGeom prst="ellipse">
+            <a:avLst/>
+          </a:prstGeom>
+          <a:solidFill>
+            <a:schemeClr val="accent1"/>
+          </a:solidFill>
+        </p:spPr>
+        <p:style>
+          <a:lnRef idx="1">
+            <a:schemeClr val="accent1"/>
+          </a:lnRef>
+          <a:fillRef idx="3">
+            <a:schemeClr val="accent1"/>
+          </a:fillRef>
+          <a:effectRef idx="2">
+            <a:schemeClr val="accent1"/>
+          </a:effectRef>
+          <a:fontRef idx="minor">
+            <a:schemeClr val="lt1"/>
+          </a:fontRef>
+        </p:style>
+        <p:txBody>
+          <a:bodyPr rtlCol="0" anchor="ctr"/>
+          <a:lstStyle/>
+          <a:p>
+            <a:pPr algn="ctr"/>
+            <a:r>
+              <a:rPr lang="en-US" dirty="0" smtClean="0"/>
+              <a:t>Component</a:t>
+            </a:r>
+          </a:p>
+          <a:p>
+            <a:pPr algn="ctr"/>
+            <a:r>
+              <a:rPr lang="en-US" dirty="0" smtClean="0"/>
+              <a:t>Service</a:t>
+            </a:r>
+            <a:endParaRPr lang="en-US" dirty="0"/>
+          </a:p>
+        </p:txBody>
+      </p:sp>
+      <p:cxnSp>
+        <p:nvCxnSpPr>
+          <p:cNvPr id="20" name="Elbow Connector 19"/>
+          <p:cNvCxnSpPr>
+            <a:stCxn id="17" idx="0"/>
+            <a:endCxn id="19" idx="3"/>
+          </p:cNvCxnSpPr>
+          <p:nvPr/>
+        </p:nvCxnSpPr>
+        <p:spPr>
+          <a:xfrm rot="5400000" flipH="1" flipV="1">
+            <a:off x="4001764" y="1389269"/>
+            <a:ext cx="402586" cy="374876"/>
+          </a:xfrm>
+          <a:prstGeom prst="bentConnector3">
+            <a:avLst>
+              <a:gd name="adj1" fmla="val 50000"/>
+            </a:avLst>
+          </a:prstGeom>
+          <a:ln>
+            <a:tailEnd type="arrow"/>
+          </a:ln>
+        </p:spPr>
+        <p:style>
+          <a:lnRef idx="2">
+            <a:schemeClr val="accent1"/>
+          </a:lnRef>
+          <a:fillRef idx="0">
+            <a:schemeClr val="accent1"/>
+          </a:fillRef>
+          <a:effectRef idx="1">
+            <a:schemeClr val="accent1"/>
+          </a:effectRef>
+          <a:fontRef idx="minor">
+            <a:schemeClr val="tx1"/>
+          </a:fontRef>
+        </p:style>
+      </p:cxnSp>
+      <p:cxnSp>
+        <p:nvCxnSpPr>
+          <p:cNvPr id="21" name="Elbow Connector 20"/>
+          <p:cNvCxnSpPr>
+            <a:stCxn id="19" idx="5"/>
+            <a:endCxn id="18" idx="0"/>
+          </p:cNvCxnSpPr>
+          <p:nvPr/>
+        </p:nvCxnSpPr>
+        <p:spPr>
+          <a:xfrm rot="16200000" flipH="1">
+            <a:off x="5856039" y="1392895"/>
+            <a:ext cx="409842" cy="374880"/>
+          </a:xfrm>
+          <a:prstGeom prst="bentConnector3">
+            <a:avLst>
+              <a:gd name="adj1" fmla="val 50000"/>
+            </a:avLst>
+          </a:prstGeom>
+          <a:ln>
+            <a:tailEnd type="arrow"/>
+          </a:ln>
+        </p:spPr>
+        <p:style>
+          <a:lnRef idx="2">
+            <a:schemeClr val="accent1"/>
+          </a:lnRef>
+          <a:fillRef idx="0">
+            <a:schemeClr val="accent1"/>
+          </a:fillRef>
+          <a:effectRef idx="1">
+            <a:schemeClr val="accent1"/>
+          </a:effectRef>
+          <a:fontRef idx="minor">
+            <a:schemeClr val="tx1"/>
+          </a:fontRef>
+        </p:style>
+      </p:cxnSp>
+      <p:cxnSp>
+        <p:nvCxnSpPr>
+          <p:cNvPr id="22" name="Straight Arrow Connector 21"/>
+          <p:cNvCxnSpPr>
+            <a:endCxn id="17" idx="4"/>
+          </p:cNvCxnSpPr>
+          <p:nvPr/>
+        </p:nvCxnSpPr>
+        <p:spPr>
+          <a:xfrm rot="5400000" flipH="1" flipV="1">
+            <a:off x="3870478" y="2467430"/>
+            <a:ext cx="217714" cy="72568"/>
+          </a:xfrm>
+          <a:prstGeom prst="straightConnector1">
+            <a:avLst/>
+          </a:prstGeom>
+          <a:ln>
+            <a:solidFill>
+              <a:schemeClr val="accent1"/>
+            </a:solidFill>
+            <a:tailEnd type="arrow"/>
+          </a:ln>
+        </p:spPr>
+        <p:style>
+          <a:lnRef idx="2">
+            <a:schemeClr val="accent1"/>
+          </a:lnRef>
+          <a:fillRef idx="0">
+            <a:schemeClr val="accent1"/>
+          </a:fillRef>
+          <a:effectRef idx="1">
+            <a:schemeClr val="accent1"/>
+          </a:effectRef>
+          <a:fontRef idx="minor">
+            <a:schemeClr val="tx1"/>
+          </a:fontRef>
+        </p:style>
+      </p:cxnSp>
+      <p:cxnSp>
+        <p:nvCxnSpPr>
+          <p:cNvPr id="23" name="Straight Arrow Connector 22"/>
+          <p:cNvCxnSpPr>
+            <a:stCxn id="18" idx="4"/>
+          </p:cNvCxnSpPr>
+          <p:nvPr/>
+        </p:nvCxnSpPr>
+        <p:spPr>
+          <a:xfrm rot="16200000" flipH="1">
+            <a:off x="6157685" y="2492828"/>
+            <a:ext cx="246744" cy="65314"/>
+          </a:xfrm>
+          <a:prstGeom prst="straightConnector1">
+            <a:avLst/>
+          </a:prstGeom>
+          <a:ln>
+            <a:solidFill>
+              <a:schemeClr val="accent1"/>
+            </a:solidFill>
+            <a:tailEnd type="arrow"/>
+          </a:ln>
+        </p:spPr>
+        <p:style>
+          <a:lnRef idx="2">
+            <a:schemeClr val="accent1"/>
+          </a:lnRef>
+          <a:fillRef idx="0">
+            <a:schemeClr val="accent1"/>
+          </a:fillRef>
+          <a:effectRef idx="1">
+            <a:schemeClr val="accent1"/>
+          </a:effectRef>
+          <a:fontRef idx="minor">
+            <a:schemeClr val="tx1"/>
+          </a:fontRef>
+        </p:style>
+      </p:cxnSp>
+      <p:sp>
+        <p:nvSpPr>
+          <p:cNvPr id="25" name="TextBox 24"/>
+          <p:cNvSpPr txBox="1"/>
+          <p:nvPr/>
+        </p:nvSpPr>
+        <p:spPr>
+          <a:xfrm>
+            <a:off x="418862" y="3512594"/>
+            <a:ext cx="1840643" cy="954107"/>
+          </a:xfrm>
+          <a:prstGeom prst="rect">
+            <a:avLst/>
+          </a:prstGeom>
+          <a:noFill/>
+        </p:spPr>
+        <p:txBody>
+          <a:bodyPr wrap="none" rtlCol="0">
+            <a:spAutoFit/>
+          </a:bodyPr>
+          <a:lstStyle/>
+          <a:p>
+            <a:r>
+              <a:rPr lang="en-US" sz="2800"/>
+              <a:t>Protocol</a:t>
+            </a:r>
+          </a:p>
+          <a:p>
+            <a:r>
+              <a:rPr lang="en-US" sz="2800"/>
+              <a:t>Multiplicity</a:t>
+            </a:r>
+            <a:endParaRPr lang="en-US"/>
+          </a:p>
+        </p:txBody>
+      </p:sp>
+      <p:sp>
+        <p:nvSpPr>
+          <p:cNvPr id="26" name="Rectangle 25"/>
+          <p:cNvSpPr/>
+          <p:nvPr/>
+        </p:nvSpPr>
+        <p:spPr>
+          <a:xfrm>
+            <a:off x="2098708" y="2846819"/>
+            <a:ext cx="677214" cy="1862048"/>
+          </a:xfrm>
+          <a:prstGeom prst="rect">
+            <a:avLst/>
+          </a:prstGeom>
+        </p:spPr>
+        <p:txBody>
+          <a:bodyPr wrap="none">
+            <a:spAutoFit/>
+          </a:bodyPr>
+          <a:lstStyle/>
+          <a:p>
+            <a:r>
+              <a:rPr lang="en-US" sz="11500"/>
+              <a:t>{</a:t>
+            </a:r>
+            <a:endParaRPr lang="en-US" sz="2000"/>
+          </a:p>
+        </p:txBody>
+      </p:sp>
+    </p:spTree>
+  </p:cSld>
+  <p:clrMapOvr>
+    <a:masterClrMapping/>
+  </p:clrMapOvr>
+</p:sld>
+</file>
+
+<file path=ppt/slides/slide6.xml><?xml version="1.0" encoding="utf-8"?>
+<p:sld xmlns:a="http://schemas.openxmlformats.org/drawingml/2006/main" xmlns:r="http://schemas.openxmlformats.org/officeDocument/2006/relationships" xmlns:mc="http://schemas.openxmlformats.org/markup-compatibility/2006" xmlns:mv="urn:schemas-microsoft-com:mac:vml" xmlns:p="http://schemas.openxmlformats.org/presentationml/2006/main" mc:Ignorable="mv" mc:PreserveAttributes="mv:*">
+  <p:cSld>
+    <p:spTree>
+      <p:nvGrpSpPr>
+        <p:cNvPr id="1" name=""/>
+        <p:cNvGrpSpPr/>
+        <p:nvPr/>
+      </p:nvGrpSpPr>
+      <p:grpSpPr>
+        <a:xfrm>
+          <a:off x="0" y="0"/>
+          <a:ext cx="0" cy="0"/>
+          <a:chOff x="0" y="0"/>
+          <a:chExt cx="0" cy="0"/>
+        </a:xfrm>
+      </p:grpSpPr>
+      <p:sp>
+        <p:nvSpPr>
           <p:cNvPr id="50" name="Arc 49"/>
           <p:cNvSpPr/>
           <p:nvPr/>
@@ -7184,6 +8222,36 @@
           </a:fontRef>
         </p:style>
       </p:cxnSp>
+      <p:sp>
+        <p:nvSpPr>
+          <p:cNvPr id="31" name="TextBox 30"/>
+          <p:cNvSpPr txBox="1"/>
+          <p:nvPr/>
+        </p:nvSpPr>
+        <p:spPr>
+          <a:xfrm>
+            <a:off x="609599" y="6400800"/>
+            <a:ext cx="4091084" cy="461665"/>
+          </a:xfrm>
+          <a:prstGeom prst="rect">
+            <a:avLst/>
+          </a:prstGeom>
+          <a:noFill/>
+        </p:spPr>
+        <p:txBody>
+          <a:bodyPr wrap="none" rtlCol="0">
+            <a:spAutoFit/>
+          </a:bodyPr>
+          <a:lstStyle/>
+          <a:p>
+            <a:r>
+              <a:rPr lang="en-US" sz="2400" dirty="0" smtClean="0"/>
+              <a:t>Eucalyptus Message Processing</a:t>
+            </a:r>
+            <a:endParaRPr lang="en-US" sz="2400" dirty="0"/>
+          </a:p>
+        </p:txBody>
+      </p:sp>
     </p:spTree>
   </p:cSld>
   <p:clrMapOvr>

</xml_diff>